<commit_message>
Presentation finished, almost everything ready.
</commit_message>
<xml_diff>
--- a/documents/WeatherBot.pptx
+++ b/documents/WeatherBot.pptx
@@ -5,10 +5,10 @@
     <p:sldMasterId id="2147483648" r:id="rId4"/>
   </p:sldMasterIdLst>
   <p:notesMasterIdLst>
-    <p:notesMasterId r:id="rId12"/>
+    <p:notesMasterId r:id="rId11"/>
   </p:notesMasterIdLst>
   <p:handoutMasterIdLst>
-    <p:handoutMasterId r:id="rId13"/>
+    <p:handoutMasterId r:id="rId12"/>
   </p:handoutMasterIdLst>
   <p:sldIdLst>
     <p:sldId id="317" r:id="rId5"/>
@@ -16,8 +16,7 @@
     <p:sldId id="278" r:id="rId7"/>
     <p:sldId id="309" r:id="rId8"/>
     <p:sldId id="263" r:id="rId9"/>
-    <p:sldId id="316" r:id="rId10"/>
-    <p:sldId id="304" r:id="rId11"/>
+    <p:sldId id="304" r:id="rId10"/>
   </p:sldIdLst>
   <p:sldSz cx="12192000" cy="6858000"/>
   <p:notesSz cx="6858000" cy="9144000"/>
@@ -118,7 +117,7 @@
   </p:defaultTextStyle>
   <p:extLst>
     <p:ext uri="{EFAFB233-063F-42B5-8137-9DF3F51BA10A}">
-      <p15:sldGuideLst xmlns="" xmlns:p15="http://schemas.microsoft.com/office/powerpoint/2012/main">
+      <p15:sldGuideLst xmlns:p15="http://schemas.microsoft.com/office/powerpoint/2012/main" xmlns="">
         <p15:guide id="1" orient="horz" pos="528" userDrawn="1">
           <p15:clr>
             <a:srgbClr val="A4A3A4"/>
@@ -152,7 +151,7 @@
       </p15:sldGuideLst>
     </p:ext>
     <p:ext uri="{2D200454-40CA-4A62-9FC3-DE9A4176ACB9}">
-      <p15:notesGuideLst xmlns="" xmlns:p15="http://schemas.microsoft.com/office/powerpoint/2012/main"/>
+      <p15:notesGuideLst xmlns:p15="http://schemas.microsoft.com/office/powerpoint/2012/main" xmlns=""/>
     </p:ext>
   </p:extLst>
 </p:presentation>
@@ -191,7 +190,7 @@
           <p:cNvPr id="3" name="Date Placeholder 2">
             <a:extLst>
               <a:ext uri="{FF2B5EF4-FFF2-40B4-BE49-F238E27FC236}">
-                <a16:creationId xmlns="" xmlns:a16="http://schemas.microsoft.com/office/drawing/2014/main" id="{F40C5F7C-3F93-522E-4DB1-E016D699CBB6}"/>
+                <a16:creationId xmlns:a16="http://schemas.microsoft.com/office/drawing/2014/main" xmlns="" id="{F40C5F7C-3F93-522E-4DB1-E016D699CBB6}"/>
               </a:ext>
             </a:extLst>
           </p:cNvPr>
@@ -222,7 +221,7 @@
             <a:fld id="{FD913024-4032-4B4F-8680-09D5E08EDB6E}" type="datetimeFigureOut">
               <a:rPr lang="en-US" smtClean="0"/>
               <a:pPr/>
-              <a:t>4/8/2024</a:t>
+              <a:t>4/11/2024</a:t>
             </a:fld>
             <a:endParaRPr lang="en-US" dirty="0"/>
           </a:p>
@@ -233,7 +232,7 @@
           <p:cNvPr id="4" name="Footer Placeholder 3">
             <a:extLst>
               <a:ext uri="{FF2B5EF4-FFF2-40B4-BE49-F238E27FC236}">
-                <a16:creationId xmlns="" xmlns:a16="http://schemas.microsoft.com/office/drawing/2014/main" id="{82DB79D9-119F-07C7-DC8E-1956644EEE97}"/>
+                <a16:creationId xmlns:a16="http://schemas.microsoft.com/office/drawing/2014/main" xmlns="" id="{82DB79D9-119F-07C7-DC8E-1956644EEE97}"/>
               </a:ext>
             </a:extLst>
           </p:cNvPr>
@@ -270,7 +269,7 @@
           <p:cNvPr id="5" name="Slide Number Placeholder 4">
             <a:extLst>
               <a:ext uri="{FF2B5EF4-FFF2-40B4-BE49-F238E27FC236}">
-                <a16:creationId xmlns="" xmlns:a16="http://schemas.microsoft.com/office/drawing/2014/main" id="{30B67CF1-7BD0-9ABA-036D-3A8479FC0985}"/>
+                <a16:creationId xmlns:a16="http://schemas.microsoft.com/office/drawing/2014/main" xmlns="" id="{30B67CF1-7BD0-9ABA-036D-3A8479FC0985}"/>
               </a:ext>
             </a:extLst>
           </p:cNvPr>
@@ -310,7 +309,7 @@
     </p:spTree>
     <p:extLst>
       <p:ext uri="{BB962C8B-B14F-4D97-AF65-F5344CB8AC3E}">
-        <p14:creationId xmlns="" xmlns:p14="http://schemas.microsoft.com/office/powerpoint/2010/main" val="956478492"/>
+        <p14:creationId xmlns:p14="http://schemas.microsoft.com/office/powerpoint/2010/main" xmlns="" val="956478492"/>
       </p:ext>
     </p:extLst>
   </p:cSld>
@@ -401,7 +400,7 @@
             <a:fld id="{F2AE225E-43E0-7047-8ADB-DD9EBB41B4D0}" type="datetimeFigureOut">
               <a:rPr lang="en-US" noProof="0" smtClean="0"/>
               <a:pPr/>
-              <a:t>4/8/2024</a:t>
+              <a:t>4/11/2024</a:t>
             </a:fld>
             <a:endParaRPr lang="en-US" noProof="0" dirty="0"/>
           </a:p>
@@ -569,7 +568,7 @@
     </p:spTree>
     <p:extLst>
       <p:ext uri="{BB962C8B-B14F-4D97-AF65-F5344CB8AC3E}">
-        <p14:creationId xmlns="" xmlns:p14="http://schemas.microsoft.com/office/powerpoint/2010/main" val="3353669211"/>
+        <p14:creationId xmlns:p14="http://schemas.microsoft.com/office/powerpoint/2010/main" xmlns="" val="3353669211"/>
       </p:ext>
     </p:extLst>
   </p:cSld>
@@ -677,7 +676,7 @@
         <p:cNvPr id="1" name="">
           <a:extLst>
             <a:ext uri="{FF2B5EF4-FFF2-40B4-BE49-F238E27FC236}">
-              <a16:creationId xmlns="" xmlns:a16="http://schemas.microsoft.com/office/drawing/2014/main" id="{03DF2165-AECD-AC0B-0A46-19E82DC25772}"/>
+              <a16:creationId xmlns:a16="http://schemas.microsoft.com/office/drawing/2014/main" xmlns="" id="{03DF2165-AECD-AC0B-0A46-19E82DC25772}"/>
             </a:ext>
           </a:extLst>
         </p:cNvPr>
@@ -697,7 +696,7 @@
           <p:cNvPr id="2" name="Slide Image Placeholder 1">
             <a:extLst>
               <a:ext uri="{FF2B5EF4-FFF2-40B4-BE49-F238E27FC236}">
-                <a16:creationId xmlns="" xmlns:a16="http://schemas.microsoft.com/office/drawing/2014/main" id="{2910EBC2-FFC3-2482-86CA-A129EAAABBC5}"/>
+                <a16:creationId xmlns:a16="http://schemas.microsoft.com/office/drawing/2014/main" xmlns="" id="{2910EBC2-FFC3-2482-86CA-A129EAAABBC5}"/>
               </a:ext>
             </a:extLst>
           </p:cNvPr>
@@ -715,7 +714,7 @@
           <p:cNvPr id="3" name="Notes Placeholder 2">
             <a:extLst>
               <a:ext uri="{FF2B5EF4-FFF2-40B4-BE49-F238E27FC236}">
-                <a16:creationId xmlns="" xmlns:a16="http://schemas.microsoft.com/office/drawing/2014/main" id="{48704D6B-CA75-C920-89B4-EA8B79E6D4DB}"/>
+                <a16:creationId xmlns:a16="http://schemas.microsoft.com/office/drawing/2014/main" xmlns="" id="{48704D6B-CA75-C920-89B4-EA8B79E6D4DB}"/>
               </a:ext>
             </a:extLst>
           </p:cNvPr>
@@ -740,7 +739,7 @@
           <p:cNvPr id="4" name="Slide Number Placeholder 3">
             <a:extLst>
               <a:ext uri="{FF2B5EF4-FFF2-40B4-BE49-F238E27FC236}">
-                <a16:creationId xmlns="" xmlns:a16="http://schemas.microsoft.com/office/drawing/2014/main" id="{16C1BFD7-3F26-AFD4-F030-DBE1AE11C1D7}"/>
+                <a16:creationId xmlns:a16="http://schemas.microsoft.com/office/drawing/2014/main" xmlns="" id="{16C1BFD7-3F26-AFD4-F030-DBE1AE11C1D7}"/>
               </a:ext>
             </a:extLst>
           </p:cNvPr>
@@ -768,7 +767,7 @@
     </p:spTree>
     <p:extLst>
       <p:ext uri="{BB962C8B-B14F-4D97-AF65-F5344CB8AC3E}">
-        <p14:creationId xmlns="" xmlns:p14="http://schemas.microsoft.com/office/powerpoint/2010/main" val="75031625"/>
+        <p14:creationId xmlns:p14="http://schemas.microsoft.com/office/powerpoint/2010/main" xmlns="" val="75031625"/>
       </p:ext>
     </p:extLst>
   </p:cSld>
@@ -853,7 +852,7 @@
     </p:spTree>
     <p:extLst>
       <p:ext uri="{BB962C8B-B14F-4D97-AF65-F5344CB8AC3E}">
-        <p14:creationId xmlns="" xmlns:p14="http://schemas.microsoft.com/office/powerpoint/2010/main" val="1473721629"/>
+        <p14:creationId xmlns:p14="http://schemas.microsoft.com/office/powerpoint/2010/main" xmlns="" val="1473721629"/>
       </p:ext>
     </p:extLst>
   </p:cSld>
@@ -938,7 +937,7 @@
     </p:spTree>
     <p:extLst>
       <p:ext uri="{BB962C8B-B14F-4D97-AF65-F5344CB8AC3E}">
-        <p14:creationId xmlns="" xmlns:p14="http://schemas.microsoft.com/office/powerpoint/2010/main" val="674091861"/>
+        <p14:creationId xmlns:p14="http://schemas.microsoft.com/office/powerpoint/2010/main" xmlns="" val="674091861"/>
       </p:ext>
     </p:extLst>
   </p:cSld>
@@ -1023,7 +1022,7 @@
     </p:spTree>
     <p:extLst>
       <p:ext uri="{BB962C8B-B14F-4D97-AF65-F5344CB8AC3E}">
-        <p14:creationId xmlns="" xmlns:p14="http://schemas.microsoft.com/office/powerpoint/2010/main" val="87366391"/>
+        <p14:creationId xmlns:p14="http://schemas.microsoft.com/office/powerpoint/2010/main" xmlns="" val="87366391"/>
       </p:ext>
     </p:extLst>
   </p:cSld>
@@ -1108,7 +1107,7 @@
     </p:spTree>
     <p:extLst>
       <p:ext uri="{BB962C8B-B14F-4D97-AF65-F5344CB8AC3E}">
-        <p14:creationId xmlns="" xmlns:p14="http://schemas.microsoft.com/office/powerpoint/2010/main" val="2308133455"/>
+        <p14:creationId xmlns:p14="http://schemas.microsoft.com/office/powerpoint/2010/main" xmlns="" val="2308133455"/>
       </p:ext>
     </p:extLst>
   </p:cSld>
@@ -1184,7 +1183,7 @@
             <a:fld id="{7C366290-4595-5745-A50F-D5EC13BAC604}" type="slidenum">
               <a:rPr lang="en-US" noProof="0" smtClean="0"/>
               <a:pPr/>
-              <a:t>7</a:t>
+              <a:t>6</a:t>
             </a:fld>
             <a:endParaRPr lang="en-US" noProof="0" dirty="0"/>
           </a:p>
@@ -1193,7 +1192,7 @@
     </p:spTree>
     <p:extLst>
       <p:ext uri="{BB962C8B-B14F-4D97-AF65-F5344CB8AC3E}">
-        <p14:creationId xmlns="" xmlns:p14="http://schemas.microsoft.com/office/powerpoint/2010/main" val="4105550432"/>
+        <p14:creationId xmlns:p14="http://schemas.microsoft.com/office/powerpoint/2010/main" xmlns="" val="4105550432"/>
       </p:ext>
     </p:extLst>
   </p:cSld>
@@ -1233,10 +1232,10 @@
           <p:cNvPr id="29" name="Freeform: Shape 28">
             <a:extLst>
               <a:ext uri="{FF2B5EF4-FFF2-40B4-BE49-F238E27FC236}">
-                <a16:creationId xmlns="" xmlns:a16="http://schemas.microsoft.com/office/drawing/2014/main" id="{4D792B1F-855B-FC83-1023-94C0976E9848}"/>
+                <a16:creationId xmlns:a16="http://schemas.microsoft.com/office/drawing/2014/main" xmlns="" id="{4D792B1F-855B-FC83-1023-94C0976E9848}"/>
               </a:ext>
               <a:ext uri="{C183D7F6-B498-43B3-948B-1728B52AA6E4}">
-                <adec:decorative xmlns="" xmlns:adec="http://schemas.microsoft.com/office/drawing/2017/decorative" val="1"/>
+                <adec:decorative xmlns:adec="http://schemas.microsoft.com/office/drawing/2017/decorative" xmlns="" val="1"/>
               </a:ext>
             </a:extLst>
           </p:cNvPr>
@@ -1435,10 +1434,10 @@
           <p:cNvPr id="7" name="Freeform: Shape 6">
             <a:extLst>
               <a:ext uri="{FF2B5EF4-FFF2-40B4-BE49-F238E27FC236}">
-                <a16:creationId xmlns="" xmlns:a16="http://schemas.microsoft.com/office/drawing/2014/main" id="{EF359D7C-AC03-77FE-CA1D-B96B46B08D16}"/>
+                <a16:creationId xmlns:a16="http://schemas.microsoft.com/office/drawing/2014/main" xmlns="" id="{EF359D7C-AC03-77FE-CA1D-B96B46B08D16}"/>
               </a:ext>
               <a:ext uri="{C183D7F6-B498-43B3-948B-1728B52AA6E4}">
-                <adec:decorative xmlns="" xmlns:adec="http://schemas.microsoft.com/office/drawing/2017/decorative" val="1"/>
+                <adec:decorative xmlns:adec="http://schemas.microsoft.com/office/drawing/2017/decorative" xmlns="" val="1"/>
               </a:ext>
             </a:extLst>
           </p:cNvPr>
@@ -1765,10 +1764,10 @@
           <p:cNvPr id="34" name="Freeform: Shape 33">
             <a:extLst>
               <a:ext uri="{FF2B5EF4-FFF2-40B4-BE49-F238E27FC236}">
-                <a16:creationId xmlns="" xmlns:a16="http://schemas.microsoft.com/office/drawing/2014/main" id="{C9AA487F-3729-4692-1A21-35558A2D840B}"/>
+                <a16:creationId xmlns:a16="http://schemas.microsoft.com/office/drawing/2014/main" xmlns="" id="{C9AA487F-3729-4692-1A21-35558A2D840B}"/>
               </a:ext>
               <a:ext uri="{C183D7F6-B498-43B3-948B-1728B52AA6E4}">
-                <adec:decorative xmlns="" xmlns:adec="http://schemas.microsoft.com/office/drawing/2017/decorative" val="1"/>
+                <adec:decorative xmlns:adec="http://schemas.microsoft.com/office/drawing/2017/decorative" xmlns="" val="1"/>
               </a:ext>
             </a:extLst>
           </p:cNvPr>
@@ -1890,10 +1889,10 @@
           <p:cNvPr id="23" name="Freeform: Shape 22">
             <a:extLst>
               <a:ext uri="{FF2B5EF4-FFF2-40B4-BE49-F238E27FC236}">
-                <a16:creationId xmlns="" xmlns:a16="http://schemas.microsoft.com/office/drawing/2014/main" id="{84B8E19A-569B-855B-EBF8-C02F2998ABC8}"/>
+                <a16:creationId xmlns:a16="http://schemas.microsoft.com/office/drawing/2014/main" xmlns="" id="{84B8E19A-569B-855B-EBF8-C02F2998ABC8}"/>
               </a:ext>
               <a:ext uri="{C183D7F6-B498-43B3-948B-1728B52AA6E4}">
-                <adec:decorative xmlns="" xmlns:adec="http://schemas.microsoft.com/office/drawing/2017/decorative" val="1"/>
+                <adec:decorative xmlns:adec="http://schemas.microsoft.com/office/drawing/2017/decorative" xmlns="" val="1"/>
               </a:ext>
             </a:extLst>
           </p:cNvPr>
@@ -4525,7 +4524,7 @@
           <p:cNvPr id="2" name="Title 1">
             <a:extLst>
               <a:ext uri="{FF2B5EF4-FFF2-40B4-BE49-F238E27FC236}">
-                <a16:creationId xmlns="" xmlns:a16="http://schemas.microsoft.com/office/drawing/2014/main" id="{C9EEA626-63D9-B376-D5C7-F7B224767D92}"/>
+                <a16:creationId xmlns:a16="http://schemas.microsoft.com/office/drawing/2014/main" xmlns="" id="{C9EEA626-63D9-B376-D5C7-F7B224767D92}"/>
               </a:ext>
             </a:extLst>
           </p:cNvPr>
@@ -4560,7 +4559,7 @@
     </p:spTree>
     <p:extLst>
       <p:ext uri="{BB962C8B-B14F-4D97-AF65-F5344CB8AC3E}">
-        <p14:creationId xmlns="" xmlns:p14="http://schemas.microsoft.com/office/powerpoint/2010/main" val="747404475"/>
+        <p14:creationId xmlns:p14="http://schemas.microsoft.com/office/powerpoint/2010/main" xmlns="" val="747404475"/>
       </p:ext>
     </p:extLst>
   </p:cSld>
@@ -4600,10 +4599,10 @@
           <p:cNvPr id="17" name="Freeform: Shape 51">
             <a:extLst>
               <a:ext uri="{FF2B5EF4-FFF2-40B4-BE49-F238E27FC236}">
-                <a16:creationId xmlns="" xmlns:a16="http://schemas.microsoft.com/office/drawing/2014/main" id="{4A781A8E-199F-1F48-C80E-B6501B563323}"/>
+                <a16:creationId xmlns:a16="http://schemas.microsoft.com/office/drawing/2014/main" xmlns="" id="{4A781A8E-199F-1F48-C80E-B6501B563323}"/>
               </a:ext>
               <a:ext uri="{C183D7F6-B498-43B3-948B-1728B52AA6E4}">
-                <adec:decorative xmlns="" xmlns:adec="http://schemas.microsoft.com/office/drawing/2017/decorative" val="1"/>
+                <adec:decorative xmlns:adec="http://schemas.microsoft.com/office/drawing/2017/decorative" xmlns="" val="1"/>
               </a:ext>
             </a:extLst>
           </p:cNvPr>
@@ -4724,10 +4723,10 @@
           <p:cNvPr id="24" name="Freeform: Shape 23">
             <a:extLst>
               <a:ext uri="{FF2B5EF4-FFF2-40B4-BE49-F238E27FC236}">
-                <a16:creationId xmlns="" xmlns:a16="http://schemas.microsoft.com/office/drawing/2014/main" id="{11C6679A-1B60-DCCD-7295-255649B92C60}"/>
+                <a16:creationId xmlns:a16="http://schemas.microsoft.com/office/drawing/2014/main" xmlns="" id="{11C6679A-1B60-DCCD-7295-255649B92C60}"/>
               </a:ext>
               <a:ext uri="{C183D7F6-B498-43B3-948B-1728B52AA6E4}">
-                <adec:decorative xmlns="" xmlns:adec="http://schemas.microsoft.com/office/drawing/2017/decorative" val="1"/>
+                <adec:decorative xmlns:adec="http://schemas.microsoft.com/office/drawing/2017/decorative" xmlns="" val="1"/>
               </a:ext>
             </a:extLst>
           </p:cNvPr>
@@ -4982,10 +4981,10 @@
           <p:cNvPr id="6" name="Freeform: Shape 22">
             <a:extLst>
               <a:ext uri="{FF2B5EF4-FFF2-40B4-BE49-F238E27FC236}">
-                <a16:creationId xmlns="" xmlns:a16="http://schemas.microsoft.com/office/drawing/2014/main" id="{1C466053-4CA7-4CBB-C1D2-19FE899BEDFC}"/>
+                <a16:creationId xmlns:a16="http://schemas.microsoft.com/office/drawing/2014/main" xmlns="" id="{1C466053-4CA7-4CBB-C1D2-19FE899BEDFC}"/>
               </a:ext>
               <a:ext uri="{C183D7F6-B498-43B3-948B-1728B52AA6E4}">
-                <adec:decorative xmlns="" xmlns:adec="http://schemas.microsoft.com/office/drawing/2017/decorative" val="1"/>
+                <adec:decorative xmlns:adec="http://schemas.microsoft.com/office/drawing/2017/decorative" xmlns="" val="1"/>
               </a:ext>
             </a:extLst>
           </p:cNvPr>
@@ -6001,10 +6000,10 @@
           <p:cNvPr id="18" name="Straight Connector 17">
             <a:extLst>
               <a:ext uri="{FF2B5EF4-FFF2-40B4-BE49-F238E27FC236}">
-                <a16:creationId xmlns="" xmlns:a16="http://schemas.microsoft.com/office/drawing/2014/main" id="{1100480F-88D3-CF82-FAF8-9527C86BCAE2}"/>
+                <a16:creationId xmlns:a16="http://schemas.microsoft.com/office/drawing/2014/main" xmlns="" id="{1100480F-88D3-CF82-FAF8-9527C86BCAE2}"/>
               </a:ext>
               <a:ext uri="{C183D7F6-B498-43B3-948B-1728B52AA6E4}">
-                <adec:decorative xmlns="" xmlns:adec="http://schemas.microsoft.com/office/drawing/2017/decorative" val="1"/>
+                <adec:decorative xmlns:adec="http://schemas.microsoft.com/office/drawing/2017/decorative" xmlns="" val="1"/>
               </a:ext>
             </a:extLst>
           </p:cNvPr>
@@ -6047,7 +6046,7 @@
           <p:cNvPr id="5" name="Title 1">
             <a:extLst>
               <a:ext uri="{FF2B5EF4-FFF2-40B4-BE49-F238E27FC236}">
-                <a16:creationId xmlns="" xmlns:a16="http://schemas.microsoft.com/office/drawing/2014/main" id="{05F17713-1E50-F9DA-1134-DEB4A4AEA114}"/>
+                <a16:creationId xmlns:a16="http://schemas.microsoft.com/office/drawing/2014/main" xmlns="" id="{05F17713-1E50-F9DA-1134-DEB4A4AEA114}"/>
               </a:ext>
             </a:extLst>
           </p:cNvPr>
@@ -6081,7 +6080,7 @@
           <p:cNvPr id="3" name="Content Placeholder 6">
             <a:extLst>
               <a:ext uri="{FF2B5EF4-FFF2-40B4-BE49-F238E27FC236}">
-                <a16:creationId xmlns="" xmlns:a16="http://schemas.microsoft.com/office/drawing/2014/main" id="{05A7D8CB-7B8B-DA38-6E7E-0DAEB7D29967}"/>
+                <a16:creationId xmlns:a16="http://schemas.microsoft.com/office/drawing/2014/main" xmlns="" id="{05A7D8CB-7B8B-DA38-6E7E-0DAEB7D29967}"/>
               </a:ext>
             </a:extLst>
           </p:cNvPr>
@@ -6182,7 +6181,7 @@
           <p:cNvPr id="10" name="Content Placeholder 6">
             <a:extLst>
               <a:ext uri="{FF2B5EF4-FFF2-40B4-BE49-F238E27FC236}">
-                <a16:creationId xmlns="" xmlns:a16="http://schemas.microsoft.com/office/drawing/2014/main" id="{CE441B96-235E-1744-83C7-22A1E6ED8BB3}"/>
+                <a16:creationId xmlns:a16="http://schemas.microsoft.com/office/drawing/2014/main" xmlns="" id="{CE441B96-235E-1744-83C7-22A1E6ED8BB3}"/>
               </a:ext>
             </a:extLst>
           </p:cNvPr>
@@ -6284,7 +6283,7 @@
           <p:cNvPr id="4" name="Slide Number Placeholder 5">
             <a:extLst>
               <a:ext uri="{FF2B5EF4-FFF2-40B4-BE49-F238E27FC236}">
-                <a16:creationId xmlns="" xmlns:a16="http://schemas.microsoft.com/office/drawing/2014/main" id="{CF605979-8A00-C008-E1AA-6AC1F9EABEAF}"/>
+                <a16:creationId xmlns:a16="http://schemas.microsoft.com/office/drawing/2014/main" xmlns="" id="{CF605979-8A00-C008-E1AA-6AC1F9EABEAF}"/>
               </a:ext>
             </a:extLst>
           </p:cNvPr>
@@ -6329,7 +6328,7 @@
     </p:spTree>
     <p:extLst>
       <p:ext uri="{BB962C8B-B14F-4D97-AF65-F5344CB8AC3E}">
-        <p14:creationId xmlns="" xmlns:p14="http://schemas.microsoft.com/office/powerpoint/2010/main" val="2236171487"/>
+        <p14:creationId xmlns:p14="http://schemas.microsoft.com/office/powerpoint/2010/main" xmlns="" val="2236171487"/>
       </p:ext>
     </p:extLst>
   </p:cSld>
@@ -6338,7 +6337,7 @@
   </p:clrMapOvr>
   <p:extLst>
     <p:ext uri="{DCECCB84-F9BA-43D5-87BE-67443E8EF086}">
-      <p15:sldGuideLst xmlns="" xmlns:p15="http://schemas.microsoft.com/office/powerpoint/2012/main">
+      <p15:sldGuideLst xmlns:p15="http://schemas.microsoft.com/office/powerpoint/2012/main" xmlns="">
         <p15:guide id="1" orient="horz" pos="3984">
           <p15:clr>
             <a:srgbClr val="FBAE40"/>
@@ -6395,10 +6394,10 @@
           <p:cNvPr id="13" name="Freeform: Shape 12">
             <a:extLst>
               <a:ext uri="{FF2B5EF4-FFF2-40B4-BE49-F238E27FC236}">
-                <a16:creationId xmlns="" xmlns:a16="http://schemas.microsoft.com/office/drawing/2014/main" id="{B05A86D8-26B0-1ADB-0CE2-B445D2A2866D}"/>
+                <a16:creationId xmlns:a16="http://schemas.microsoft.com/office/drawing/2014/main" xmlns="" id="{B05A86D8-26B0-1ADB-0CE2-B445D2A2866D}"/>
               </a:ext>
               <a:ext uri="{C183D7F6-B498-43B3-948B-1728B52AA6E4}">
-                <adec:decorative xmlns="" xmlns:adec="http://schemas.microsoft.com/office/drawing/2017/decorative" val="1"/>
+                <adec:decorative xmlns:adec="http://schemas.microsoft.com/office/drawing/2017/decorative" xmlns="" val="1"/>
               </a:ext>
             </a:extLst>
           </p:cNvPr>
@@ -6528,10 +6527,10 @@
           <p:cNvPr id="19" name="Freeform: Shape 18">
             <a:extLst>
               <a:ext uri="{FF2B5EF4-FFF2-40B4-BE49-F238E27FC236}">
-                <a16:creationId xmlns="" xmlns:a16="http://schemas.microsoft.com/office/drawing/2014/main" id="{33A68E8B-64DF-46D3-2FA2-4BBBBF8BFB15}"/>
+                <a16:creationId xmlns:a16="http://schemas.microsoft.com/office/drawing/2014/main" xmlns="" id="{33A68E8B-64DF-46D3-2FA2-4BBBBF8BFB15}"/>
               </a:ext>
               <a:ext uri="{C183D7F6-B498-43B3-948B-1728B52AA6E4}">
-                <adec:decorative xmlns="" xmlns:adec="http://schemas.microsoft.com/office/drawing/2017/decorative" val="1"/>
+                <adec:decorative xmlns:adec="http://schemas.microsoft.com/office/drawing/2017/decorative" xmlns="" val="1"/>
               </a:ext>
             </a:extLst>
           </p:cNvPr>
@@ -6814,7 +6813,7 @@
           <p:cNvPr id="20" name="Title 1">
             <a:extLst>
               <a:ext uri="{FF2B5EF4-FFF2-40B4-BE49-F238E27FC236}">
-                <a16:creationId xmlns="" xmlns:a16="http://schemas.microsoft.com/office/drawing/2014/main" id="{20AE86F9-DD66-DE05-383C-6220D559B0DF}"/>
+                <a16:creationId xmlns:a16="http://schemas.microsoft.com/office/drawing/2014/main" xmlns="" id="{20AE86F9-DD66-DE05-383C-6220D559B0DF}"/>
               </a:ext>
             </a:extLst>
           </p:cNvPr>
@@ -6851,7 +6850,7 @@
           <p:cNvPr id="6" name="Content Placeholder 6">
             <a:extLst>
               <a:ext uri="{FF2B5EF4-FFF2-40B4-BE49-F238E27FC236}">
-                <a16:creationId xmlns="" xmlns:a16="http://schemas.microsoft.com/office/drawing/2014/main" id="{1B0F4867-5345-BF6B-3402-DEEC3D2DDF90}"/>
+                <a16:creationId xmlns:a16="http://schemas.microsoft.com/office/drawing/2014/main" xmlns="" id="{1B0F4867-5345-BF6B-3402-DEEC3D2DDF90}"/>
               </a:ext>
             </a:extLst>
           </p:cNvPr>
@@ -6953,7 +6952,7 @@
           <p:cNvPr id="2" name="Content Placeholder 6">
             <a:extLst>
               <a:ext uri="{FF2B5EF4-FFF2-40B4-BE49-F238E27FC236}">
-                <a16:creationId xmlns="" xmlns:a16="http://schemas.microsoft.com/office/drawing/2014/main" id="{B693A8C2-EDAB-3C2B-00D3-3B9F9D64ACDC}"/>
+                <a16:creationId xmlns:a16="http://schemas.microsoft.com/office/drawing/2014/main" xmlns="" id="{B693A8C2-EDAB-3C2B-00D3-3B9F9D64ACDC}"/>
               </a:ext>
             </a:extLst>
           </p:cNvPr>
@@ -7054,7 +7053,7 @@
           <p:cNvPr id="4" name="Slide Number Placeholder 5">
             <a:extLst>
               <a:ext uri="{FF2B5EF4-FFF2-40B4-BE49-F238E27FC236}">
-                <a16:creationId xmlns="" xmlns:a16="http://schemas.microsoft.com/office/drawing/2014/main" id="{4CE52DCD-6B80-A17A-B12C-76D628BAF304}"/>
+                <a16:creationId xmlns:a16="http://schemas.microsoft.com/office/drawing/2014/main" xmlns="" id="{4CE52DCD-6B80-A17A-B12C-76D628BAF304}"/>
               </a:ext>
             </a:extLst>
           </p:cNvPr>
@@ -7099,7 +7098,7 @@
     </p:spTree>
     <p:extLst>
       <p:ext uri="{BB962C8B-B14F-4D97-AF65-F5344CB8AC3E}">
-        <p14:creationId xmlns="" xmlns:p14="http://schemas.microsoft.com/office/powerpoint/2010/main" val="339423165"/>
+        <p14:creationId xmlns:p14="http://schemas.microsoft.com/office/powerpoint/2010/main" xmlns="" val="339423165"/>
       </p:ext>
     </p:extLst>
   </p:cSld>
@@ -7108,7 +7107,7 @@
   </p:clrMapOvr>
   <p:extLst>
     <p:ext uri="{DCECCB84-F9BA-43D5-87BE-67443E8EF086}">
-      <p15:sldGuideLst xmlns="" xmlns:p15="http://schemas.microsoft.com/office/powerpoint/2012/main">
+      <p15:sldGuideLst xmlns:p15="http://schemas.microsoft.com/office/powerpoint/2012/main" xmlns="">
         <p15:guide id="1" orient="horz" pos="3984">
           <p15:clr>
             <a:srgbClr val="FBAE40"/>
@@ -7165,10 +7164,10 @@
           <p:cNvPr id="6" name="Freeform 5">
             <a:extLst>
               <a:ext uri="{FF2B5EF4-FFF2-40B4-BE49-F238E27FC236}">
-                <a16:creationId xmlns="" xmlns:a16="http://schemas.microsoft.com/office/drawing/2014/main" id="{CADEA8BB-3550-ABDA-99A6-455084D5D432}"/>
+                <a16:creationId xmlns:a16="http://schemas.microsoft.com/office/drawing/2014/main" xmlns="" id="{CADEA8BB-3550-ABDA-99A6-455084D5D432}"/>
               </a:ext>
               <a:ext uri="{C183D7F6-B498-43B3-948B-1728B52AA6E4}">
-                <adec:decorative xmlns="" xmlns:adec="http://schemas.microsoft.com/office/drawing/2017/decorative" val="1"/>
+                <adec:decorative xmlns:adec="http://schemas.microsoft.com/office/drawing/2017/decorative" xmlns="" val="1"/>
               </a:ext>
             </a:extLst>
           </p:cNvPr>
@@ -7358,10 +7357,10 @@
           <p:cNvPr id="18" name="Freeform: Shape 17">
             <a:extLst>
               <a:ext uri="{FF2B5EF4-FFF2-40B4-BE49-F238E27FC236}">
-                <a16:creationId xmlns="" xmlns:a16="http://schemas.microsoft.com/office/drawing/2014/main" id="{F0A8F0DB-3D3D-DC0F-84AC-4386B58AD6E5}"/>
+                <a16:creationId xmlns:a16="http://schemas.microsoft.com/office/drawing/2014/main" xmlns="" id="{F0A8F0DB-3D3D-DC0F-84AC-4386B58AD6E5}"/>
               </a:ext>
               <a:ext uri="{C183D7F6-B498-43B3-948B-1728B52AA6E4}">
-                <adec:decorative xmlns="" xmlns:adec="http://schemas.microsoft.com/office/drawing/2017/decorative" val="1"/>
+                <adec:decorative xmlns:adec="http://schemas.microsoft.com/office/drawing/2017/decorative" xmlns="" val="1"/>
               </a:ext>
             </a:extLst>
           </p:cNvPr>
@@ -7467,7 +7466,7 @@
           <p:cNvPr id="45" name="Title 1">
             <a:extLst>
               <a:ext uri="{FF2B5EF4-FFF2-40B4-BE49-F238E27FC236}">
-                <a16:creationId xmlns="" xmlns:a16="http://schemas.microsoft.com/office/drawing/2014/main" id="{FDA50B04-DEA5-DCCF-0DAD-0D3B122FD652}"/>
+                <a16:creationId xmlns:a16="http://schemas.microsoft.com/office/drawing/2014/main" xmlns="" id="{FDA50B04-DEA5-DCCF-0DAD-0D3B122FD652}"/>
               </a:ext>
             </a:extLst>
           </p:cNvPr>
@@ -7504,7 +7503,7 @@
           <p:cNvPr id="7" name="Table Placeholder 4">
             <a:extLst>
               <a:ext uri="{FF2B5EF4-FFF2-40B4-BE49-F238E27FC236}">
-                <a16:creationId xmlns="" xmlns:a16="http://schemas.microsoft.com/office/drawing/2014/main" id="{A8715227-A125-7CA3-B8F5-9D5894E8C981}"/>
+                <a16:creationId xmlns:a16="http://schemas.microsoft.com/office/drawing/2014/main" xmlns="" id="{A8715227-A125-7CA3-B8F5-9D5894E8C981}"/>
               </a:ext>
             </a:extLst>
           </p:cNvPr>
@@ -7534,7 +7533,7 @@
           <p:cNvPr id="3" name="Slide Number Placeholder 5">
             <a:extLst>
               <a:ext uri="{FF2B5EF4-FFF2-40B4-BE49-F238E27FC236}">
-                <a16:creationId xmlns="" xmlns:a16="http://schemas.microsoft.com/office/drawing/2014/main" id="{CEC2E35B-5EFD-B330-984C-15A012C90B8A}"/>
+                <a16:creationId xmlns:a16="http://schemas.microsoft.com/office/drawing/2014/main" xmlns="" id="{CEC2E35B-5EFD-B330-984C-15A012C90B8A}"/>
               </a:ext>
             </a:extLst>
           </p:cNvPr>
@@ -7579,7 +7578,7 @@
     </p:spTree>
     <p:extLst>
       <p:ext uri="{BB962C8B-B14F-4D97-AF65-F5344CB8AC3E}">
-        <p14:creationId xmlns="" xmlns:p14="http://schemas.microsoft.com/office/powerpoint/2010/main" val="2306274893"/>
+        <p14:creationId xmlns:p14="http://schemas.microsoft.com/office/powerpoint/2010/main" xmlns="" val="2306274893"/>
       </p:ext>
     </p:extLst>
   </p:cSld>
@@ -7588,7 +7587,7 @@
   </p:clrMapOvr>
   <p:extLst>
     <p:ext uri="{DCECCB84-F9BA-43D5-87BE-67443E8EF086}">
-      <p15:sldGuideLst xmlns="" xmlns:p15="http://schemas.microsoft.com/office/powerpoint/2012/main">
+      <p15:sldGuideLst xmlns:p15="http://schemas.microsoft.com/office/powerpoint/2012/main" xmlns="">
         <p15:guide id="1" orient="horz" pos="3984">
           <p15:clr>
             <a:srgbClr val="FBAE40"/>
@@ -7645,10 +7644,10 @@
           <p:cNvPr id="8" name="Freeform 7">
             <a:extLst>
               <a:ext uri="{FF2B5EF4-FFF2-40B4-BE49-F238E27FC236}">
-                <a16:creationId xmlns="" xmlns:a16="http://schemas.microsoft.com/office/drawing/2014/main" id="{686C03E6-655F-A394-4461-7BC878C418BB}"/>
+                <a16:creationId xmlns:a16="http://schemas.microsoft.com/office/drawing/2014/main" xmlns="" id="{686C03E6-655F-A394-4461-7BC878C418BB}"/>
               </a:ext>
               <a:ext uri="{C183D7F6-B498-43B3-948B-1728B52AA6E4}">
-                <adec:decorative xmlns="" xmlns:adec="http://schemas.microsoft.com/office/drawing/2017/decorative" val="1"/>
+                <adec:decorative xmlns:adec="http://schemas.microsoft.com/office/drawing/2017/decorative" xmlns="" val="1"/>
               </a:ext>
             </a:extLst>
           </p:cNvPr>
@@ -7809,10 +7808,10 @@
           <p:cNvPr id="25" name="Freeform: Shape 24">
             <a:extLst>
               <a:ext uri="{FF2B5EF4-FFF2-40B4-BE49-F238E27FC236}">
-                <a16:creationId xmlns="" xmlns:a16="http://schemas.microsoft.com/office/drawing/2014/main" id="{BF7A62BA-11D3-585A-8CBD-5E0FB4DE522D}"/>
+                <a16:creationId xmlns:a16="http://schemas.microsoft.com/office/drawing/2014/main" xmlns="" id="{BF7A62BA-11D3-585A-8CBD-5E0FB4DE522D}"/>
               </a:ext>
               <a:ext uri="{C183D7F6-B498-43B3-948B-1728B52AA6E4}">
-                <adec:decorative xmlns="" xmlns:adec="http://schemas.microsoft.com/office/drawing/2017/decorative" val="1"/>
+                <adec:decorative xmlns:adec="http://schemas.microsoft.com/office/drawing/2017/decorative" xmlns="" val="1"/>
               </a:ext>
             </a:extLst>
           </p:cNvPr>
@@ -9023,10 +9022,10 @@
           <p:cNvPr id="13" name="Freeform: Shape 12">
             <a:extLst>
               <a:ext uri="{FF2B5EF4-FFF2-40B4-BE49-F238E27FC236}">
-                <a16:creationId xmlns="" xmlns:a16="http://schemas.microsoft.com/office/drawing/2014/main" id="{8E1AE81E-772F-B009-AF15-C0FC060518A7}"/>
+                <a16:creationId xmlns:a16="http://schemas.microsoft.com/office/drawing/2014/main" xmlns="" id="{8E1AE81E-772F-B009-AF15-C0FC060518A7}"/>
               </a:ext>
               <a:ext uri="{C183D7F6-B498-43B3-948B-1728B52AA6E4}">
-                <adec:decorative xmlns="" xmlns:adec="http://schemas.microsoft.com/office/drawing/2017/decorative" val="1"/>
+                <adec:decorative xmlns:adec="http://schemas.microsoft.com/office/drawing/2017/decorative" xmlns="" val="1"/>
               </a:ext>
             </a:extLst>
           </p:cNvPr>
@@ -9353,7 +9352,7 @@
           <p:cNvPr id="2" name="Title 1">
             <a:extLst>
               <a:ext uri="{FF2B5EF4-FFF2-40B4-BE49-F238E27FC236}">
-                <a16:creationId xmlns="" xmlns:a16="http://schemas.microsoft.com/office/drawing/2014/main" id="{C9EEA626-63D9-B376-D5C7-F7B224767D92}"/>
+                <a16:creationId xmlns:a16="http://schemas.microsoft.com/office/drawing/2014/main" xmlns="" id="{C9EEA626-63D9-B376-D5C7-F7B224767D92}"/>
               </a:ext>
             </a:extLst>
           </p:cNvPr>
@@ -9390,7 +9389,7 @@
           <p:cNvPr id="3" name="Content Placeholder 6">
             <a:extLst>
               <a:ext uri="{FF2B5EF4-FFF2-40B4-BE49-F238E27FC236}">
-                <a16:creationId xmlns="" xmlns:a16="http://schemas.microsoft.com/office/drawing/2014/main" id="{436A1765-4F66-C345-840A-D6C73BD96BB8}"/>
+                <a16:creationId xmlns:a16="http://schemas.microsoft.com/office/drawing/2014/main" xmlns="" id="{436A1765-4F66-C345-840A-D6C73BD96BB8}"/>
               </a:ext>
             </a:extLst>
           </p:cNvPr>
@@ -9490,7 +9489,7 @@
     </p:spTree>
     <p:extLst>
       <p:ext uri="{BB962C8B-B14F-4D97-AF65-F5344CB8AC3E}">
-        <p14:creationId xmlns="" xmlns:p14="http://schemas.microsoft.com/office/powerpoint/2010/main" val="1657158466"/>
+        <p14:creationId xmlns:p14="http://schemas.microsoft.com/office/powerpoint/2010/main" xmlns="" val="1657158466"/>
       </p:ext>
     </p:extLst>
   </p:cSld>
@@ -9530,10 +9529,10 @@
           <p:cNvPr id="3" name="Group 2">
             <a:extLst>
               <a:ext uri="{FF2B5EF4-FFF2-40B4-BE49-F238E27FC236}">
-                <a16:creationId xmlns="" xmlns:a16="http://schemas.microsoft.com/office/drawing/2014/main" id="{ADCC72F6-C144-5508-40C5-E1B3FC085B94}"/>
+                <a16:creationId xmlns:a16="http://schemas.microsoft.com/office/drawing/2014/main" xmlns="" id="{ADCC72F6-C144-5508-40C5-E1B3FC085B94}"/>
               </a:ext>
               <a:ext uri="{C183D7F6-B498-43B3-948B-1728B52AA6E4}">
-                <adec:decorative xmlns="" xmlns:adec="http://schemas.microsoft.com/office/drawing/2017/decorative" val="1"/>
+                <adec:decorative xmlns:adec="http://schemas.microsoft.com/office/drawing/2017/decorative" xmlns="" val="1"/>
               </a:ext>
             </a:extLst>
           </p:cNvPr>
@@ -9553,10 +9552,10 @@
             <p:cNvPr id="4" name="Freeform: Shape 3">
               <a:extLst>
                 <a:ext uri="{FF2B5EF4-FFF2-40B4-BE49-F238E27FC236}">
-                  <a16:creationId xmlns="" xmlns:a16="http://schemas.microsoft.com/office/drawing/2014/main" id="{FF76D2EA-2C6E-B0B2-DC0D-F9EF636E5856}"/>
+                  <a16:creationId xmlns:a16="http://schemas.microsoft.com/office/drawing/2014/main" xmlns="" id="{FF76D2EA-2C6E-B0B2-DC0D-F9EF636E5856}"/>
                 </a:ext>
                 <a:ext uri="{C183D7F6-B498-43B3-948B-1728B52AA6E4}">
-                  <adec:decorative xmlns="" xmlns:adec="http://schemas.microsoft.com/office/drawing/2017/decorative" val="1"/>
+                  <adec:decorative xmlns:adec="http://schemas.microsoft.com/office/drawing/2017/decorative" xmlns="" val="1"/>
                 </a:ext>
               </a:extLst>
             </p:cNvPr>
@@ -9777,10 +9776,10 @@
             <p:cNvPr id="5" name="Freeform: Shape 4">
               <a:extLst>
                 <a:ext uri="{FF2B5EF4-FFF2-40B4-BE49-F238E27FC236}">
-                  <a16:creationId xmlns="" xmlns:a16="http://schemas.microsoft.com/office/drawing/2014/main" id="{90315871-F40F-D512-8E3F-B40F36BD4224}"/>
+                  <a16:creationId xmlns:a16="http://schemas.microsoft.com/office/drawing/2014/main" xmlns="" id="{90315871-F40F-D512-8E3F-B40F36BD4224}"/>
                 </a:ext>
                 <a:ext uri="{C183D7F6-B498-43B3-948B-1728B52AA6E4}">
-                  <adec:decorative xmlns="" xmlns:adec="http://schemas.microsoft.com/office/drawing/2017/decorative" val="1"/>
+                  <adec:decorative xmlns:adec="http://schemas.microsoft.com/office/drawing/2017/decorative" xmlns="" val="1"/>
                 </a:ext>
               </a:extLst>
             </p:cNvPr>
@@ -9978,10 +9977,10 @@
           <p:cNvPr id="6" name="Freeform: Shape 5">
             <a:extLst>
               <a:ext uri="{FF2B5EF4-FFF2-40B4-BE49-F238E27FC236}">
-                <a16:creationId xmlns="" xmlns:a16="http://schemas.microsoft.com/office/drawing/2014/main" id="{10C11C1A-EFCF-278A-D083-93F07D4DEA67}"/>
+                <a16:creationId xmlns:a16="http://schemas.microsoft.com/office/drawing/2014/main" xmlns="" id="{10C11C1A-EFCF-278A-D083-93F07D4DEA67}"/>
               </a:ext>
               <a:ext uri="{C183D7F6-B498-43B3-948B-1728B52AA6E4}">
-                <adec:decorative xmlns="" xmlns:adec="http://schemas.microsoft.com/office/drawing/2017/decorative" val="1"/>
+                <adec:decorative xmlns:adec="http://schemas.microsoft.com/office/drawing/2017/decorative" xmlns="" val="1"/>
               </a:ext>
             </a:extLst>
           </p:cNvPr>
@@ -11176,7 +11175,7 @@
           <p:cNvPr id="7" name="Slide Number Placeholder 5">
             <a:extLst>
               <a:ext uri="{FF2B5EF4-FFF2-40B4-BE49-F238E27FC236}">
-                <a16:creationId xmlns="" xmlns:a16="http://schemas.microsoft.com/office/drawing/2014/main" id="{5B1E4400-E511-F21B-0AFD-0D362BA52FF0}"/>
+                <a16:creationId xmlns:a16="http://schemas.microsoft.com/office/drawing/2014/main" xmlns="" id="{5B1E4400-E511-F21B-0AFD-0D362BA52FF0}"/>
               </a:ext>
             </a:extLst>
           </p:cNvPr>
@@ -11221,7 +11220,7 @@
     </p:spTree>
     <p:extLst>
       <p:ext uri="{BB962C8B-B14F-4D97-AF65-F5344CB8AC3E}">
-        <p14:creationId xmlns="" xmlns:p14="http://schemas.microsoft.com/office/powerpoint/2010/main" val="3021782729"/>
+        <p14:creationId xmlns:p14="http://schemas.microsoft.com/office/powerpoint/2010/main" xmlns="" val="3021782729"/>
       </p:ext>
     </p:extLst>
   </p:cSld>
@@ -11261,10 +11260,10 @@
           <p:cNvPr id="5" name="Freeform 4">
             <a:extLst>
               <a:ext uri="{FF2B5EF4-FFF2-40B4-BE49-F238E27FC236}">
-                <a16:creationId xmlns="" xmlns:a16="http://schemas.microsoft.com/office/drawing/2014/main" id="{941984E2-3225-05D3-3A3D-9D5F5840ED60}"/>
+                <a16:creationId xmlns:a16="http://schemas.microsoft.com/office/drawing/2014/main" xmlns="" id="{941984E2-3225-05D3-3A3D-9D5F5840ED60}"/>
               </a:ext>
               <a:ext uri="{C183D7F6-B498-43B3-948B-1728B52AA6E4}">
-                <adec:decorative xmlns="" xmlns:adec="http://schemas.microsoft.com/office/drawing/2017/decorative" val="1"/>
+                <adec:decorative xmlns:adec="http://schemas.microsoft.com/office/drawing/2017/decorative" xmlns="" val="1"/>
               </a:ext>
             </a:extLst>
           </p:cNvPr>
@@ -11434,10 +11433,10 @@
           <p:cNvPr id="25" name="Freeform: Shape 24">
             <a:extLst>
               <a:ext uri="{FF2B5EF4-FFF2-40B4-BE49-F238E27FC236}">
-                <a16:creationId xmlns="" xmlns:a16="http://schemas.microsoft.com/office/drawing/2014/main" id="{070813B7-403A-9A3E-5E5C-44C1680DE4C3}"/>
+                <a16:creationId xmlns:a16="http://schemas.microsoft.com/office/drawing/2014/main" xmlns="" id="{070813B7-403A-9A3E-5E5C-44C1680DE4C3}"/>
               </a:ext>
               <a:ext uri="{C183D7F6-B498-43B3-948B-1728B52AA6E4}">
-                <adec:decorative xmlns="" xmlns:adec="http://schemas.microsoft.com/office/drawing/2017/decorative" val="1"/>
+                <adec:decorative xmlns:adec="http://schemas.microsoft.com/office/drawing/2017/decorative" xmlns="" val="1"/>
               </a:ext>
             </a:extLst>
           </p:cNvPr>
@@ -12588,10 +12587,10 @@
           <p:cNvPr id="12" name="Freeform: Shape 11">
             <a:extLst>
               <a:ext uri="{FF2B5EF4-FFF2-40B4-BE49-F238E27FC236}">
-                <a16:creationId xmlns="" xmlns:a16="http://schemas.microsoft.com/office/drawing/2014/main" id="{7A7BB3C1-4B05-D5B3-C61C-1CD390CEEF2B}"/>
+                <a16:creationId xmlns:a16="http://schemas.microsoft.com/office/drawing/2014/main" xmlns="" id="{7A7BB3C1-4B05-D5B3-C61C-1CD390CEEF2B}"/>
               </a:ext>
               <a:ext uri="{C183D7F6-B498-43B3-948B-1728B52AA6E4}">
-                <adec:decorative xmlns="" xmlns:adec="http://schemas.microsoft.com/office/drawing/2017/decorative" val="1"/>
+                <adec:decorative xmlns:adec="http://schemas.microsoft.com/office/drawing/2017/decorative" xmlns="" val="1"/>
               </a:ext>
             </a:extLst>
           </p:cNvPr>
@@ -12812,10 +12811,10 @@
           <p:cNvPr id="26" name="Freeform: Shape 25">
             <a:extLst>
               <a:ext uri="{FF2B5EF4-FFF2-40B4-BE49-F238E27FC236}">
-                <a16:creationId xmlns="" xmlns:a16="http://schemas.microsoft.com/office/drawing/2014/main" id="{CE6955A7-F39A-1FBB-FF32-C6F0E3289273}"/>
+                <a16:creationId xmlns:a16="http://schemas.microsoft.com/office/drawing/2014/main" xmlns="" id="{CE6955A7-F39A-1FBB-FF32-C6F0E3289273}"/>
               </a:ext>
               <a:ext uri="{C183D7F6-B498-43B3-948B-1728B52AA6E4}">
-                <adec:decorative xmlns="" xmlns:adec="http://schemas.microsoft.com/office/drawing/2017/decorative" val="1"/>
+                <adec:decorative xmlns:adec="http://schemas.microsoft.com/office/drawing/2017/decorative" xmlns="" val="1"/>
               </a:ext>
             </a:extLst>
           </p:cNvPr>
@@ -13012,7 +13011,7 @@
           <p:cNvPr id="2" name="Title 1">
             <a:extLst>
               <a:ext uri="{FF2B5EF4-FFF2-40B4-BE49-F238E27FC236}">
-                <a16:creationId xmlns="" xmlns:a16="http://schemas.microsoft.com/office/drawing/2014/main" id="{867817C7-4A09-9188-0BD5-838E3AD61F1A}"/>
+                <a16:creationId xmlns:a16="http://schemas.microsoft.com/office/drawing/2014/main" xmlns="" id="{867817C7-4A09-9188-0BD5-838E3AD61F1A}"/>
               </a:ext>
             </a:extLst>
           </p:cNvPr>
@@ -13053,7 +13052,7 @@
           <p:cNvPr id="3" name="Content Placeholder 2">
             <a:extLst>
               <a:ext uri="{FF2B5EF4-FFF2-40B4-BE49-F238E27FC236}">
-                <a16:creationId xmlns="" xmlns:a16="http://schemas.microsoft.com/office/drawing/2014/main" id="{B847C94B-98C2-CC0F-92FC-1505771390BE}"/>
+                <a16:creationId xmlns:a16="http://schemas.microsoft.com/office/drawing/2014/main" xmlns="" id="{B847C94B-98C2-CC0F-92FC-1505771390BE}"/>
               </a:ext>
             </a:extLst>
           </p:cNvPr>
@@ -13136,7 +13135,7 @@
     </p:spTree>
     <p:extLst>
       <p:ext uri="{BB962C8B-B14F-4D97-AF65-F5344CB8AC3E}">
-        <p14:creationId xmlns="" xmlns:p14="http://schemas.microsoft.com/office/powerpoint/2010/main" val="1970575627"/>
+        <p14:creationId xmlns:p14="http://schemas.microsoft.com/office/powerpoint/2010/main" xmlns="" val="1970575627"/>
       </p:ext>
     </p:extLst>
   </p:cSld>
@@ -13145,7 +13144,7 @@
   </p:clrMapOvr>
   <p:extLst>
     <p:ext uri="{DCECCB84-F9BA-43D5-87BE-67443E8EF086}">
-      <p15:sldGuideLst xmlns="" xmlns:p15="http://schemas.microsoft.com/office/powerpoint/2012/main">
+      <p15:sldGuideLst xmlns:p15="http://schemas.microsoft.com/office/powerpoint/2012/main" xmlns="">
         <p15:guide id="1" orient="horz" pos="3984">
           <p15:clr>
             <a:srgbClr val="FBAE40"/>
@@ -13202,7 +13201,7 @@
           <p:cNvPr id="10" name="Title 1">
             <a:extLst>
               <a:ext uri="{FF2B5EF4-FFF2-40B4-BE49-F238E27FC236}">
-                <a16:creationId xmlns="" xmlns:a16="http://schemas.microsoft.com/office/drawing/2014/main" id="{06890132-DB42-A903-1EAB-CA29D3F04340}"/>
+                <a16:creationId xmlns:a16="http://schemas.microsoft.com/office/drawing/2014/main" xmlns="" id="{06890132-DB42-A903-1EAB-CA29D3F04340}"/>
               </a:ext>
             </a:extLst>
           </p:cNvPr>
@@ -13242,10 +13241,10 @@
           <p:cNvPr id="9" name="Picture 8">
             <a:extLst>
               <a:ext uri="{FF2B5EF4-FFF2-40B4-BE49-F238E27FC236}">
-                <a16:creationId xmlns="" xmlns:a16="http://schemas.microsoft.com/office/drawing/2014/main" id="{B5ED90D1-D640-D115-6711-35DE812FC014}"/>
+                <a16:creationId xmlns:a16="http://schemas.microsoft.com/office/drawing/2014/main" xmlns="" id="{B5ED90D1-D640-D115-6711-35DE812FC014}"/>
               </a:ext>
               <a:ext uri="{C183D7F6-B498-43B3-948B-1728B52AA6E4}">
-                <adec:decorative xmlns="" xmlns:adec="http://schemas.microsoft.com/office/drawing/2017/decorative" val="1"/>
+                <adec:decorative xmlns:adec="http://schemas.microsoft.com/office/drawing/2017/decorative" xmlns="" val="1"/>
               </a:ext>
             </a:extLst>
           </p:cNvPr>
@@ -13276,10 +13275,10 @@
           <p:cNvPr id="18" name="Freeform: Shape 17">
             <a:extLst>
               <a:ext uri="{FF2B5EF4-FFF2-40B4-BE49-F238E27FC236}">
-                <a16:creationId xmlns="" xmlns:a16="http://schemas.microsoft.com/office/drawing/2014/main" id="{F8D9EAE4-01F5-6C99-C91E-BF0FD0CD1CEF}"/>
+                <a16:creationId xmlns:a16="http://schemas.microsoft.com/office/drawing/2014/main" xmlns="" id="{F8D9EAE4-01F5-6C99-C91E-BF0FD0CD1CEF}"/>
               </a:ext>
               <a:ext uri="{C183D7F6-B498-43B3-948B-1728B52AA6E4}">
-                <adec:decorative xmlns="" xmlns:adec="http://schemas.microsoft.com/office/drawing/2017/decorative" val="1"/>
+                <adec:decorative xmlns:adec="http://schemas.microsoft.com/office/drawing/2017/decorative" xmlns="" val="1"/>
               </a:ext>
             </a:extLst>
           </p:cNvPr>
@@ -13487,7 +13486,7 @@
           <p:cNvPr id="21" name="Picture Placeholder 20">
             <a:extLst>
               <a:ext uri="{FF2B5EF4-FFF2-40B4-BE49-F238E27FC236}">
-                <a16:creationId xmlns="" xmlns:a16="http://schemas.microsoft.com/office/drawing/2014/main" id="{D2E95AC0-BA60-4FFD-E9E7-F2F12ACF68D0}"/>
+                <a16:creationId xmlns:a16="http://schemas.microsoft.com/office/drawing/2014/main" xmlns="" id="{D2E95AC0-BA60-4FFD-E9E7-F2F12ACF68D0}"/>
               </a:ext>
             </a:extLst>
           </p:cNvPr>
@@ -13678,7 +13677,7 @@
     </p:spTree>
     <p:extLst>
       <p:ext uri="{BB962C8B-B14F-4D97-AF65-F5344CB8AC3E}">
-        <p14:creationId xmlns="" xmlns:p14="http://schemas.microsoft.com/office/powerpoint/2010/main" val="3659711355"/>
+        <p14:creationId xmlns:p14="http://schemas.microsoft.com/office/powerpoint/2010/main" xmlns="" val="3659711355"/>
       </p:ext>
     </p:extLst>
   </p:cSld>
@@ -13718,10 +13717,10 @@
           <p:cNvPr id="3" name="Freeform 2">
             <a:extLst>
               <a:ext uri="{FF2B5EF4-FFF2-40B4-BE49-F238E27FC236}">
-                <a16:creationId xmlns="" xmlns:a16="http://schemas.microsoft.com/office/drawing/2014/main" id="{D24A04BE-9BA3-80DD-EE68-A8B8BA08532B}"/>
+                <a16:creationId xmlns:a16="http://schemas.microsoft.com/office/drawing/2014/main" xmlns="" id="{D24A04BE-9BA3-80DD-EE68-A8B8BA08532B}"/>
               </a:ext>
               <a:ext uri="{C183D7F6-B498-43B3-948B-1728B52AA6E4}">
-                <adec:decorative xmlns="" xmlns:adec="http://schemas.microsoft.com/office/drawing/2017/decorative" val="1"/>
+                <adec:decorative xmlns:adec="http://schemas.microsoft.com/office/drawing/2017/decorative" xmlns="" val="1"/>
               </a:ext>
             </a:extLst>
           </p:cNvPr>
@@ -13876,10 +13875,10 @@
           <p:cNvPr id="28" name="Freeform: Shape 27">
             <a:extLst>
               <a:ext uri="{FF2B5EF4-FFF2-40B4-BE49-F238E27FC236}">
-                <a16:creationId xmlns="" xmlns:a16="http://schemas.microsoft.com/office/drawing/2014/main" id="{9E4F6A04-3331-D4C7-3EAE-0F69B48A7C71}"/>
+                <a16:creationId xmlns:a16="http://schemas.microsoft.com/office/drawing/2014/main" xmlns="" id="{9E4F6A04-3331-D4C7-3EAE-0F69B48A7C71}"/>
               </a:ext>
               <a:ext uri="{C183D7F6-B498-43B3-948B-1728B52AA6E4}">
-                <adec:decorative xmlns="" xmlns:adec="http://schemas.microsoft.com/office/drawing/2017/decorative" val="1"/>
+                <adec:decorative xmlns:adec="http://schemas.microsoft.com/office/drawing/2017/decorative" xmlns="" val="1"/>
               </a:ext>
             </a:extLst>
           </p:cNvPr>
@@ -14060,10 +14059,10 @@
           <p:cNvPr id="30" name="Freeform: Shape 29">
             <a:extLst>
               <a:ext uri="{FF2B5EF4-FFF2-40B4-BE49-F238E27FC236}">
-                <a16:creationId xmlns="" xmlns:a16="http://schemas.microsoft.com/office/drawing/2014/main" id="{0587ACFB-02E0-79F1-D5B0-E8B18598D688}"/>
+                <a16:creationId xmlns:a16="http://schemas.microsoft.com/office/drawing/2014/main" xmlns="" id="{0587ACFB-02E0-79F1-D5B0-E8B18598D688}"/>
               </a:ext>
               <a:ext uri="{C183D7F6-B498-43B3-948B-1728B52AA6E4}">
-                <adec:decorative xmlns="" xmlns:adec="http://schemas.microsoft.com/office/drawing/2017/decorative" val="1"/>
+                <adec:decorative xmlns:adec="http://schemas.microsoft.com/office/drawing/2017/decorative" xmlns="" val="1"/>
               </a:ext>
             </a:extLst>
           </p:cNvPr>
@@ -14312,7 +14311,7 @@
           <p:cNvPr id="8" name="Title 1">
             <a:extLst>
               <a:ext uri="{FF2B5EF4-FFF2-40B4-BE49-F238E27FC236}">
-                <a16:creationId xmlns="" xmlns:a16="http://schemas.microsoft.com/office/drawing/2014/main" id="{852384F4-F6AD-F668-A66B-AEFD70995F3B}"/>
+                <a16:creationId xmlns:a16="http://schemas.microsoft.com/office/drawing/2014/main" xmlns="" id="{852384F4-F6AD-F668-A66B-AEFD70995F3B}"/>
               </a:ext>
             </a:extLst>
           </p:cNvPr>
@@ -14356,7 +14355,7 @@
           <p:cNvPr id="5" name="Picture Placeholder 4">
             <a:extLst>
               <a:ext uri="{FF2B5EF4-FFF2-40B4-BE49-F238E27FC236}">
-                <a16:creationId xmlns="" xmlns:a16="http://schemas.microsoft.com/office/drawing/2014/main" id="{1AA0A37B-4C20-7766-0623-4E06EA6A5C83}"/>
+                <a16:creationId xmlns:a16="http://schemas.microsoft.com/office/drawing/2014/main" xmlns="" id="{1AA0A37B-4C20-7766-0623-4E06EA6A5C83}"/>
               </a:ext>
             </a:extLst>
           </p:cNvPr>
@@ -14503,7 +14502,7 @@
           <p:cNvPr id="9" name="Content Placeholder 2">
             <a:extLst>
               <a:ext uri="{FF2B5EF4-FFF2-40B4-BE49-F238E27FC236}">
-                <a16:creationId xmlns="" xmlns:a16="http://schemas.microsoft.com/office/drawing/2014/main" id="{83E1E65B-8F03-21A6-6A59-95F0691D8856}"/>
+                <a16:creationId xmlns:a16="http://schemas.microsoft.com/office/drawing/2014/main" xmlns="" id="{83E1E65B-8F03-21A6-6A59-95F0691D8856}"/>
               </a:ext>
             </a:extLst>
           </p:cNvPr>
@@ -14569,7 +14568,7 @@
     </p:spTree>
     <p:extLst>
       <p:ext uri="{BB962C8B-B14F-4D97-AF65-F5344CB8AC3E}">
-        <p14:creationId xmlns="" xmlns:p14="http://schemas.microsoft.com/office/powerpoint/2010/main" val="2223444060"/>
+        <p14:creationId xmlns:p14="http://schemas.microsoft.com/office/powerpoint/2010/main" xmlns="" val="2223444060"/>
       </p:ext>
     </p:extLst>
   </p:cSld>
@@ -14609,10 +14608,10 @@
           <p:cNvPr id="8" name="Group 7">
             <a:extLst>
               <a:ext uri="{FF2B5EF4-FFF2-40B4-BE49-F238E27FC236}">
-                <a16:creationId xmlns="" xmlns:a16="http://schemas.microsoft.com/office/drawing/2014/main" id="{98639877-C4A6-4E44-C600-FE3C6CD5F187}"/>
+                <a16:creationId xmlns:a16="http://schemas.microsoft.com/office/drawing/2014/main" xmlns="" id="{98639877-C4A6-4E44-C600-FE3C6CD5F187}"/>
               </a:ext>
               <a:ext uri="{C183D7F6-B498-43B3-948B-1728B52AA6E4}">
-                <adec:decorative xmlns="" xmlns:adec="http://schemas.microsoft.com/office/drawing/2017/decorative" val="1"/>
+                <adec:decorative xmlns:adec="http://schemas.microsoft.com/office/drawing/2017/decorative" xmlns="" val="1"/>
               </a:ext>
             </a:extLst>
           </p:cNvPr>
@@ -14632,10 +14631,10 @@
             <p:cNvPr id="9" name="Freeform: Shape 8">
               <a:extLst>
                 <a:ext uri="{FF2B5EF4-FFF2-40B4-BE49-F238E27FC236}">
-                  <a16:creationId xmlns="" xmlns:a16="http://schemas.microsoft.com/office/drawing/2014/main" id="{F0439AA5-A7EE-A20E-BB67-D356776D0B21}"/>
+                  <a16:creationId xmlns:a16="http://schemas.microsoft.com/office/drawing/2014/main" xmlns="" id="{F0439AA5-A7EE-A20E-BB67-D356776D0B21}"/>
                 </a:ext>
                 <a:ext uri="{C183D7F6-B498-43B3-948B-1728B52AA6E4}">
-                  <adec:decorative xmlns="" xmlns:adec="http://schemas.microsoft.com/office/drawing/2017/decorative" val="1"/>
+                  <adec:decorative xmlns:adec="http://schemas.microsoft.com/office/drawing/2017/decorative" xmlns="" val="1"/>
                 </a:ext>
               </a:extLst>
             </p:cNvPr>
@@ -14856,10 +14855,10 @@
             <p:cNvPr id="10" name="Freeform: Shape 9">
               <a:extLst>
                 <a:ext uri="{FF2B5EF4-FFF2-40B4-BE49-F238E27FC236}">
-                  <a16:creationId xmlns="" xmlns:a16="http://schemas.microsoft.com/office/drawing/2014/main" id="{39E752F7-61F0-6779-9E8E-3541BFF7D2CF}"/>
+                  <a16:creationId xmlns:a16="http://schemas.microsoft.com/office/drawing/2014/main" xmlns="" id="{39E752F7-61F0-6779-9E8E-3541BFF7D2CF}"/>
                 </a:ext>
                 <a:ext uri="{C183D7F6-B498-43B3-948B-1728B52AA6E4}">
-                  <adec:decorative xmlns="" xmlns:adec="http://schemas.microsoft.com/office/drawing/2017/decorative" val="1"/>
+                  <adec:decorative xmlns:adec="http://schemas.microsoft.com/office/drawing/2017/decorative" xmlns="" val="1"/>
                 </a:ext>
               </a:extLst>
             </p:cNvPr>
@@ -15057,7 +15056,7 @@
           <p:cNvPr id="6" name="Title 1">
             <a:extLst>
               <a:ext uri="{FF2B5EF4-FFF2-40B4-BE49-F238E27FC236}">
-                <a16:creationId xmlns="" xmlns:a16="http://schemas.microsoft.com/office/drawing/2014/main" id="{FA7EBEDF-950A-F10B-DA20-24FB521457FC}"/>
+                <a16:creationId xmlns:a16="http://schemas.microsoft.com/office/drawing/2014/main" xmlns="" id="{FA7EBEDF-950A-F10B-DA20-24FB521457FC}"/>
               </a:ext>
             </a:extLst>
           </p:cNvPr>
@@ -15094,10 +15093,10 @@
           <p:cNvPr id="12" name="Freeform 11">
             <a:extLst>
               <a:ext uri="{FF2B5EF4-FFF2-40B4-BE49-F238E27FC236}">
-                <a16:creationId xmlns="" xmlns:a16="http://schemas.microsoft.com/office/drawing/2014/main" id="{6FD0E545-8D0D-B848-836A-23CEBCD6B0A5}"/>
+                <a16:creationId xmlns:a16="http://schemas.microsoft.com/office/drawing/2014/main" xmlns="" id="{6FD0E545-8D0D-B848-836A-23CEBCD6B0A5}"/>
               </a:ext>
               <a:ext uri="{C183D7F6-B498-43B3-948B-1728B52AA6E4}">
-                <adec:decorative xmlns="" xmlns:adec="http://schemas.microsoft.com/office/drawing/2017/decorative" val="1"/>
+                <adec:decorative xmlns:adec="http://schemas.microsoft.com/office/drawing/2017/decorative" xmlns="" val="1"/>
               </a:ext>
             </a:extLst>
           </p:cNvPr>
@@ -15199,10 +15198,10 @@
           <p:cNvPr id="15" name="Freeform 14">
             <a:extLst>
               <a:ext uri="{FF2B5EF4-FFF2-40B4-BE49-F238E27FC236}">
-                <a16:creationId xmlns="" xmlns:a16="http://schemas.microsoft.com/office/drawing/2014/main" id="{7114E853-6F7C-9899-77FD-0E77D0A86207}"/>
+                <a16:creationId xmlns:a16="http://schemas.microsoft.com/office/drawing/2014/main" xmlns="" id="{7114E853-6F7C-9899-77FD-0E77D0A86207}"/>
               </a:ext>
               <a:ext uri="{C183D7F6-B498-43B3-948B-1728B52AA6E4}">
-                <adec:decorative xmlns="" xmlns:adec="http://schemas.microsoft.com/office/drawing/2017/decorative" val="1"/>
+                <adec:decorative xmlns:adec="http://schemas.microsoft.com/office/drawing/2017/decorative" xmlns="" val="1"/>
               </a:ext>
             </a:extLst>
           </p:cNvPr>
@@ -16213,10 +16212,10 @@
           <p:cNvPr id="13" name="Freeform 12">
             <a:extLst>
               <a:ext uri="{FF2B5EF4-FFF2-40B4-BE49-F238E27FC236}">
-                <a16:creationId xmlns="" xmlns:a16="http://schemas.microsoft.com/office/drawing/2014/main" id="{69002426-033B-400A-C519-AF4C659C4F05}"/>
+                <a16:creationId xmlns:a16="http://schemas.microsoft.com/office/drawing/2014/main" xmlns="" id="{69002426-033B-400A-C519-AF4C659C4F05}"/>
               </a:ext>
               <a:ext uri="{C183D7F6-B498-43B3-948B-1728B52AA6E4}">
-                <adec:decorative xmlns="" xmlns:adec="http://schemas.microsoft.com/office/drawing/2017/decorative" val="1"/>
+                <adec:decorative xmlns:adec="http://schemas.microsoft.com/office/drawing/2017/decorative" xmlns="" val="1"/>
               </a:ext>
             </a:extLst>
           </p:cNvPr>
@@ -16338,7 +16337,7 @@
           <p:cNvPr id="7" name="Content Placeholder 6">
             <a:extLst>
               <a:ext uri="{FF2B5EF4-FFF2-40B4-BE49-F238E27FC236}">
-                <a16:creationId xmlns="" xmlns:a16="http://schemas.microsoft.com/office/drawing/2014/main" id="{13980755-170E-8438-DC1B-7B3283F2A49D}"/>
+                <a16:creationId xmlns:a16="http://schemas.microsoft.com/office/drawing/2014/main" xmlns="" id="{13980755-170E-8438-DC1B-7B3283F2A49D}"/>
               </a:ext>
             </a:extLst>
           </p:cNvPr>
@@ -16418,7 +16417,7 @@
           <p:cNvPr id="3" name="Slide Number Placeholder 5">
             <a:extLst>
               <a:ext uri="{FF2B5EF4-FFF2-40B4-BE49-F238E27FC236}">
-                <a16:creationId xmlns="" xmlns:a16="http://schemas.microsoft.com/office/drawing/2014/main" id="{933C021B-6AA4-3C5D-099F-96D113A1495C}"/>
+                <a16:creationId xmlns:a16="http://schemas.microsoft.com/office/drawing/2014/main" xmlns="" id="{933C021B-6AA4-3C5D-099F-96D113A1495C}"/>
               </a:ext>
             </a:extLst>
           </p:cNvPr>
@@ -16463,7 +16462,7 @@
     </p:spTree>
     <p:extLst>
       <p:ext uri="{BB962C8B-B14F-4D97-AF65-F5344CB8AC3E}">
-        <p14:creationId xmlns="" xmlns:p14="http://schemas.microsoft.com/office/powerpoint/2010/main" val="3338622671"/>
+        <p14:creationId xmlns:p14="http://schemas.microsoft.com/office/powerpoint/2010/main" xmlns="" val="3338622671"/>
       </p:ext>
     </p:extLst>
   </p:cSld>
@@ -16503,10 +16502,10 @@
           <p:cNvPr id="52" name="Freeform: Shape 51">
             <a:extLst>
               <a:ext uri="{FF2B5EF4-FFF2-40B4-BE49-F238E27FC236}">
-                <a16:creationId xmlns="" xmlns:a16="http://schemas.microsoft.com/office/drawing/2014/main" id="{90FA743D-BDB5-4069-7325-E91CA7BC3ED7}"/>
+                <a16:creationId xmlns:a16="http://schemas.microsoft.com/office/drawing/2014/main" xmlns="" id="{90FA743D-BDB5-4069-7325-E91CA7BC3ED7}"/>
               </a:ext>
               <a:ext uri="{C183D7F6-B498-43B3-948B-1728B52AA6E4}">
-                <adec:decorative xmlns="" xmlns:adec="http://schemas.microsoft.com/office/drawing/2017/decorative" val="1"/>
+                <adec:decorative xmlns:adec="http://schemas.microsoft.com/office/drawing/2017/decorative" xmlns="" val="1"/>
               </a:ext>
             </a:extLst>
           </p:cNvPr>
@@ -16627,10 +16626,10 @@
           <p:cNvPr id="4" name="Freeform 3">
             <a:extLst>
               <a:ext uri="{FF2B5EF4-FFF2-40B4-BE49-F238E27FC236}">
-                <a16:creationId xmlns="" xmlns:a16="http://schemas.microsoft.com/office/drawing/2014/main" id="{2FE03F25-D589-68A8-30C7-175547B6A9EE}"/>
+                <a16:creationId xmlns:a16="http://schemas.microsoft.com/office/drawing/2014/main" xmlns="" id="{2FE03F25-D589-68A8-30C7-175547B6A9EE}"/>
               </a:ext>
               <a:ext uri="{C183D7F6-B498-43B3-948B-1728B52AA6E4}">
-                <adec:decorative xmlns="" xmlns:adec="http://schemas.microsoft.com/office/drawing/2017/decorative" val="1"/>
+                <adec:decorative xmlns:adec="http://schemas.microsoft.com/office/drawing/2017/decorative" xmlns="" val="1"/>
               </a:ext>
             </a:extLst>
           </p:cNvPr>
@@ -18940,10 +18939,10 @@
           <p:cNvPr id="6" name="Graphic 5">
             <a:extLst>
               <a:ext uri="{FF2B5EF4-FFF2-40B4-BE49-F238E27FC236}">
-                <a16:creationId xmlns="" xmlns:a16="http://schemas.microsoft.com/office/drawing/2014/main" id="{7CB19B63-2AAF-E86D-D7F1-B659DB36B5AC}"/>
+                <a16:creationId xmlns:a16="http://schemas.microsoft.com/office/drawing/2014/main" xmlns="" id="{7CB19B63-2AAF-E86D-D7F1-B659DB36B5AC}"/>
               </a:ext>
               <a:ext uri="{C183D7F6-B498-43B3-948B-1728B52AA6E4}">
-                <adec:decorative xmlns="" xmlns:adec="http://schemas.microsoft.com/office/drawing/2017/decorative" val="1"/>
+                <adec:decorative xmlns:adec="http://schemas.microsoft.com/office/drawing/2017/decorative" xmlns="" val="1"/>
               </a:ext>
             </a:extLst>
           </p:cNvPr>
@@ -18957,7 +18956,7 @@
             <a:alphaModFix/>
             <a:extLst>
               <a:ext uri="{96DAC541-7B7A-43D3-8B79-37D633B846F1}">
-                <asvg:svgBlip xmlns="" xmlns:asvg="http://schemas.microsoft.com/office/drawing/2016/SVG/main" r:embed="rId3"/>
+                <asvg:svgBlip xmlns:asvg="http://schemas.microsoft.com/office/drawing/2016/SVG/main" xmlns="" r:embed="rId3"/>
               </a:ext>
             </a:extLst>
           </a:blip>
@@ -19024,10 +19023,10 @@
           <p:cNvPr id="22" name="Freeform: Shape 21">
             <a:extLst>
               <a:ext uri="{FF2B5EF4-FFF2-40B4-BE49-F238E27FC236}">
-                <a16:creationId xmlns="" xmlns:a16="http://schemas.microsoft.com/office/drawing/2014/main" id="{83712F38-4391-A499-56E2-8F095A506D08}"/>
+                <a16:creationId xmlns:a16="http://schemas.microsoft.com/office/drawing/2014/main" xmlns="" id="{83712F38-4391-A499-56E2-8F095A506D08}"/>
               </a:ext>
               <a:ext uri="{C183D7F6-B498-43B3-948B-1728B52AA6E4}">
-                <adec:decorative xmlns="" xmlns:adec="http://schemas.microsoft.com/office/drawing/2017/decorative" val="1"/>
+                <adec:decorative xmlns:adec="http://schemas.microsoft.com/office/drawing/2017/decorative" xmlns="" val="1"/>
               </a:ext>
             </a:extLst>
           </p:cNvPr>
@@ -20222,7 +20221,7 @@
           <p:cNvPr id="2" name="Title 1">
             <a:extLst>
               <a:ext uri="{FF2B5EF4-FFF2-40B4-BE49-F238E27FC236}">
-                <a16:creationId xmlns="" xmlns:a16="http://schemas.microsoft.com/office/drawing/2014/main" id="{867817C7-4A09-9188-0BD5-838E3AD61F1A}"/>
+                <a16:creationId xmlns:a16="http://schemas.microsoft.com/office/drawing/2014/main" xmlns="" id="{867817C7-4A09-9188-0BD5-838E3AD61F1A}"/>
               </a:ext>
             </a:extLst>
           </p:cNvPr>
@@ -20261,7 +20260,7 @@
           <p:cNvPr id="32" name="Text Placeholder 31">
             <a:extLst>
               <a:ext uri="{FF2B5EF4-FFF2-40B4-BE49-F238E27FC236}">
-                <a16:creationId xmlns="" xmlns:a16="http://schemas.microsoft.com/office/drawing/2014/main" id="{ACAB76B7-8AE6-9FE8-3022-219618D5810C}"/>
+                <a16:creationId xmlns:a16="http://schemas.microsoft.com/office/drawing/2014/main" xmlns="" id="{ACAB76B7-8AE6-9FE8-3022-219618D5810C}"/>
               </a:ext>
             </a:extLst>
           </p:cNvPr>
@@ -20306,7 +20305,7 @@
     </p:spTree>
     <p:extLst>
       <p:ext uri="{BB962C8B-B14F-4D97-AF65-F5344CB8AC3E}">
-        <p14:creationId xmlns="" xmlns:p14="http://schemas.microsoft.com/office/powerpoint/2010/main" val="3429611174"/>
+        <p14:creationId xmlns:p14="http://schemas.microsoft.com/office/powerpoint/2010/main" xmlns="" val="3429611174"/>
       </p:ext>
     </p:extLst>
   </p:cSld>
@@ -20315,7 +20314,7 @@
   </p:clrMapOvr>
   <p:extLst>
     <p:ext uri="{DCECCB84-F9BA-43D5-87BE-67443E8EF086}">
-      <p15:sldGuideLst xmlns="" xmlns:p15="http://schemas.microsoft.com/office/powerpoint/2012/main">
+      <p15:sldGuideLst xmlns:p15="http://schemas.microsoft.com/office/powerpoint/2012/main" xmlns="">
         <p15:guide id="1" orient="horz" pos="3984">
           <p15:clr>
             <a:srgbClr val="FBAE40"/>
@@ -20372,7 +20371,7 @@
           <p:cNvPr id="3" name="Title 1">
             <a:extLst>
               <a:ext uri="{FF2B5EF4-FFF2-40B4-BE49-F238E27FC236}">
-                <a16:creationId xmlns="" xmlns:a16="http://schemas.microsoft.com/office/drawing/2014/main" id="{F179F09D-FCEF-2378-FD6D-390137D19D7F}"/>
+                <a16:creationId xmlns:a16="http://schemas.microsoft.com/office/drawing/2014/main" xmlns="" id="{F179F09D-FCEF-2378-FD6D-390137D19D7F}"/>
               </a:ext>
             </a:extLst>
           </p:cNvPr>
@@ -20409,7 +20408,7 @@
           <p:cNvPr id="2" name="Content Placeholder 6">
             <a:extLst>
               <a:ext uri="{FF2B5EF4-FFF2-40B4-BE49-F238E27FC236}">
-                <a16:creationId xmlns="" xmlns:a16="http://schemas.microsoft.com/office/drawing/2014/main" id="{43E2AC72-73DB-7038-4867-55751103F51A}"/>
+                <a16:creationId xmlns:a16="http://schemas.microsoft.com/office/drawing/2014/main" xmlns="" id="{43E2AC72-73DB-7038-4867-55751103F51A}"/>
               </a:ext>
             </a:extLst>
           </p:cNvPr>
@@ -20510,7 +20509,7 @@
           <p:cNvPr id="6" name="Content Placeholder 6">
             <a:extLst>
               <a:ext uri="{FF2B5EF4-FFF2-40B4-BE49-F238E27FC236}">
-                <a16:creationId xmlns="" xmlns:a16="http://schemas.microsoft.com/office/drawing/2014/main" id="{C4B21F26-677B-015C-5D71-238B3798DF57}"/>
+                <a16:creationId xmlns:a16="http://schemas.microsoft.com/office/drawing/2014/main" xmlns="" id="{C4B21F26-677B-015C-5D71-238B3798DF57}"/>
               </a:ext>
             </a:extLst>
           </p:cNvPr>
@@ -20611,10 +20610,10 @@
           <p:cNvPr id="7" name="Freeform 6">
             <a:extLst>
               <a:ext uri="{FF2B5EF4-FFF2-40B4-BE49-F238E27FC236}">
-                <a16:creationId xmlns="" xmlns:a16="http://schemas.microsoft.com/office/drawing/2014/main" id="{A3F1B258-8FBC-06A8-3A1F-466CEEDBBEF2}"/>
+                <a16:creationId xmlns:a16="http://schemas.microsoft.com/office/drawing/2014/main" xmlns="" id="{A3F1B258-8FBC-06A8-3A1F-466CEEDBBEF2}"/>
               </a:ext>
               <a:ext uri="{C183D7F6-B498-43B3-948B-1728B52AA6E4}">
-                <adec:decorative xmlns="" xmlns:adec="http://schemas.microsoft.com/office/drawing/2017/decorative" val="1"/>
+                <adec:decorative xmlns:adec="http://schemas.microsoft.com/office/drawing/2017/decorative" xmlns="" val="1"/>
               </a:ext>
             </a:extLst>
           </p:cNvPr>
@@ -21547,10 +21546,10 @@
           <p:cNvPr id="12" name="Freeform 11">
             <a:extLst>
               <a:ext uri="{FF2B5EF4-FFF2-40B4-BE49-F238E27FC236}">
-                <a16:creationId xmlns="" xmlns:a16="http://schemas.microsoft.com/office/drawing/2014/main" id="{8BAD4AF0-64CE-5C0E-5440-00F8FC6B3194}"/>
+                <a16:creationId xmlns:a16="http://schemas.microsoft.com/office/drawing/2014/main" xmlns="" id="{8BAD4AF0-64CE-5C0E-5440-00F8FC6B3194}"/>
               </a:ext>
               <a:ext uri="{C183D7F6-B498-43B3-948B-1728B52AA6E4}">
-                <adec:decorative xmlns="" xmlns:adec="http://schemas.microsoft.com/office/drawing/2017/decorative" val="1"/>
+                <adec:decorative xmlns:adec="http://schemas.microsoft.com/office/drawing/2017/decorative" xmlns="" val="1"/>
               </a:ext>
             </a:extLst>
           </p:cNvPr>
@@ -21701,7 +21700,7 @@
           <p:cNvPr id="5" name="Slide Number Placeholder 5">
             <a:extLst>
               <a:ext uri="{FF2B5EF4-FFF2-40B4-BE49-F238E27FC236}">
-                <a16:creationId xmlns="" xmlns:a16="http://schemas.microsoft.com/office/drawing/2014/main" id="{03D91060-B9BF-0FA6-BD7C-AF8E38E919DB}"/>
+                <a16:creationId xmlns:a16="http://schemas.microsoft.com/office/drawing/2014/main" xmlns="" id="{03D91060-B9BF-0FA6-BD7C-AF8E38E919DB}"/>
               </a:ext>
             </a:extLst>
           </p:cNvPr>
@@ -21746,7 +21745,7 @@
     </p:spTree>
     <p:extLst>
       <p:ext uri="{BB962C8B-B14F-4D97-AF65-F5344CB8AC3E}">
-        <p14:creationId xmlns="" xmlns:p14="http://schemas.microsoft.com/office/powerpoint/2010/main" val="3452433515"/>
+        <p14:creationId xmlns:p14="http://schemas.microsoft.com/office/powerpoint/2010/main" xmlns="" val="3452433515"/>
       </p:ext>
     </p:extLst>
   </p:cSld>
@@ -21755,7 +21754,7 @@
   </p:clrMapOvr>
   <p:extLst>
     <p:ext uri="{DCECCB84-F9BA-43D5-87BE-67443E8EF086}">
-      <p15:sldGuideLst xmlns="" xmlns:p15="http://schemas.microsoft.com/office/powerpoint/2012/main">
+      <p15:sldGuideLst xmlns:p15="http://schemas.microsoft.com/office/powerpoint/2012/main" xmlns="">
         <p15:guide id="1" orient="horz" pos="3984">
           <p15:clr>
             <a:srgbClr val="FBAE40"/>
@@ -21812,10 +21811,10 @@
           <p:cNvPr id="2" name="Group 1">
             <a:extLst>
               <a:ext uri="{FF2B5EF4-FFF2-40B4-BE49-F238E27FC236}">
-                <a16:creationId xmlns="" xmlns:a16="http://schemas.microsoft.com/office/drawing/2014/main" id="{7DCD020E-88CF-303D-F947-8EE980AC8093}"/>
+                <a16:creationId xmlns:a16="http://schemas.microsoft.com/office/drawing/2014/main" xmlns="" id="{7DCD020E-88CF-303D-F947-8EE980AC8093}"/>
               </a:ext>
               <a:ext uri="{C183D7F6-B498-43B3-948B-1728B52AA6E4}">
-                <adec:decorative xmlns="" xmlns:adec="http://schemas.microsoft.com/office/drawing/2017/decorative" val="1"/>
+                <adec:decorative xmlns:adec="http://schemas.microsoft.com/office/drawing/2017/decorative" xmlns="" val="1"/>
               </a:ext>
             </a:extLst>
           </p:cNvPr>
@@ -21835,7 +21834,7 @@
             <p:cNvPr id="9" name="Freeform: Shape 8">
               <a:extLst>
                 <a:ext uri="{FF2B5EF4-FFF2-40B4-BE49-F238E27FC236}">
-                  <a16:creationId xmlns="" xmlns:a16="http://schemas.microsoft.com/office/drawing/2014/main" id="{30B88804-97CC-BE78-8D40-672973E4CD32}"/>
+                  <a16:creationId xmlns:a16="http://schemas.microsoft.com/office/drawing/2014/main" xmlns="" id="{30B88804-97CC-BE78-8D40-672973E4CD32}"/>
                 </a:ext>
               </a:extLst>
             </p:cNvPr>
@@ -22851,7 +22850,7 @@
             <p:cNvPr id="11" name="Freeform: Shape 10">
               <a:extLst>
                 <a:ext uri="{FF2B5EF4-FFF2-40B4-BE49-F238E27FC236}">
-                  <a16:creationId xmlns="" xmlns:a16="http://schemas.microsoft.com/office/drawing/2014/main" id="{77FB28C4-D7BE-9D2F-25D0-06D2480EA06A}"/>
+                  <a16:creationId xmlns:a16="http://schemas.microsoft.com/office/drawing/2014/main" xmlns="" id="{77FB28C4-D7BE-9D2F-25D0-06D2480EA06A}"/>
                 </a:ext>
               </a:extLst>
             </p:cNvPr>
@@ -23866,7 +23865,7 @@
           <p:cNvPr id="8" name="Title 1">
             <a:extLst>
               <a:ext uri="{FF2B5EF4-FFF2-40B4-BE49-F238E27FC236}">
-                <a16:creationId xmlns="" xmlns:a16="http://schemas.microsoft.com/office/drawing/2014/main" id="{694847DB-2FD4-A0B7-D27C-B0D097130852}"/>
+                <a16:creationId xmlns:a16="http://schemas.microsoft.com/office/drawing/2014/main" xmlns="" id="{694847DB-2FD4-A0B7-D27C-B0D097130852}"/>
               </a:ext>
             </a:extLst>
           </p:cNvPr>
@@ -23903,7 +23902,7 @@
           <p:cNvPr id="10" name="Content Placeholder 6">
             <a:extLst>
               <a:ext uri="{FF2B5EF4-FFF2-40B4-BE49-F238E27FC236}">
-                <a16:creationId xmlns="" xmlns:a16="http://schemas.microsoft.com/office/drawing/2014/main" id="{75BC41E0-D44A-D8E0-DC48-F6520F28F71A}"/>
+                <a16:creationId xmlns:a16="http://schemas.microsoft.com/office/drawing/2014/main" xmlns="" id="{75BC41E0-D44A-D8E0-DC48-F6520F28F71A}"/>
               </a:ext>
             </a:extLst>
           </p:cNvPr>
@@ -23998,7 +23997,7 @@
           <p:cNvPr id="6" name="Content Placeholder 6">
             <a:extLst>
               <a:ext uri="{FF2B5EF4-FFF2-40B4-BE49-F238E27FC236}">
-                <a16:creationId xmlns="" xmlns:a16="http://schemas.microsoft.com/office/drawing/2014/main" id="{25E9E434-8C66-15D8-D6B1-5DBED995F9B5}"/>
+                <a16:creationId xmlns:a16="http://schemas.microsoft.com/office/drawing/2014/main" xmlns="" id="{25E9E434-8C66-15D8-D6B1-5DBED995F9B5}"/>
               </a:ext>
             </a:extLst>
           </p:cNvPr>
@@ -24099,7 +24098,7 @@
           <p:cNvPr id="5" name="Slide Number Placeholder 5">
             <a:extLst>
               <a:ext uri="{FF2B5EF4-FFF2-40B4-BE49-F238E27FC236}">
-                <a16:creationId xmlns="" xmlns:a16="http://schemas.microsoft.com/office/drawing/2014/main" id="{0BFE17F0-931A-B121-FFD2-AF3DBB5D6CFB}"/>
+                <a16:creationId xmlns:a16="http://schemas.microsoft.com/office/drawing/2014/main" xmlns="" id="{0BFE17F0-931A-B121-FFD2-AF3DBB5D6CFB}"/>
               </a:ext>
             </a:extLst>
           </p:cNvPr>
@@ -24144,7 +24143,7 @@
     </p:spTree>
     <p:extLst>
       <p:ext uri="{BB962C8B-B14F-4D97-AF65-F5344CB8AC3E}">
-        <p14:creationId xmlns="" xmlns:p14="http://schemas.microsoft.com/office/powerpoint/2010/main" val="4027163612"/>
+        <p14:creationId xmlns:p14="http://schemas.microsoft.com/office/powerpoint/2010/main" xmlns="" val="4027163612"/>
       </p:ext>
     </p:extLst>
   </p:cSld>
@@ -24184,10 +24183,10 @@
           <p:cNvPr id="11" name="Freeform: Shape 10">
             <a:extLst>
               <a:ext uri="{FF2B5EF4-FFF2-40B4-BE49-F238E27FC236}">
-                <a16:creationId xmlns="" xmlns:a16="http://schemas.microsoft.com/office/drawing/2014/main" id="{EB31668E-263B-8FB1-9DBB-25F22BB441B3}"/>
+                <a16:creationId xmlns:a16="http://schemas.microsoft.com/office/drawing/2014/main" xmlns="" id="{EB31668E-263B-8FB1-9DBB-25F22BB441B3}"/>
               </a:ext>
               <a:ext uri="{C183D7F6-B498-43B3-948B-1728B52AA6E4}">
-                <adec:decorative xmlns="" xmlns:adec="http://schemas.microsoft.com/office/drawing/2017/decorative" val="1"/>
+                <adec:decorative xmlns:adec="http://schemas.microsoft.com/office/drawing/2017/decorative" xmlns="" val="1"/>
               </a:ext>
             </a:extLst>
           </p:cNvPr>
@@ -24299,10 +24298,10 @@
           <p:cNvPr id="30" name="Freeform: Shape 29">
             <a:extLst>
               <a:ext uri="{FF2B5EF4-FFF2-40B4-BE49-F238E27FC236}">
-                <a16:creationId xmlns="" xmlns:a16="http://schemas.microsoft.com/office/drawing/2014/main" id="{0972DA96-A413-EF87-50D3-D8EF54FD9F55}"/>
+                <a16:creationId xmlns:a16="http://schemas.microsoft.com/office/drawing/2014/main" xmlns="" id="{0972DA96-A413-EF87-50D3-D8EF54FD9F55}"/>
               </a:ext>
               <a:ext uri="{C183D7F6-B498-43B3-948B-1728B52AA6E4}">
-                <adec:decorative xmlns="" xmlns:adec="http://schemas.microsoft.com/office/drawing/2017/decorative" val="1"/>
+                <adec:decorative xmlns:adec="http://schemas.microsoft.com/office/drawing/2017/decorative" xmlns="" val="1"/>
               </a:ext>
             </a:extLst>
           </p:cNvPr>
@@ -25316,7 +25315,7 @@
           <p:cNvPr id="20" name="Title 1">
             <a:extLst>
               <a:ext uri="{FF2B5EF4-FFF2-40B4-BE49-F238E27FC236}">
-                <a16:creationId xmlns="" xmlns:a16="http://schemas.microsoft.com/office/drawing/2014/main" id="{20AE86F9-DD66-DE05-383C-6220D559B0DF}"/>
+                <a16:creationId xmlns:a16="http://schemas.microsoft.com/office/drawing/2014/main" xmlns="" id="{20AE86F9-DD66-DE05-383C-6220D559B0DF}"/>
               </a:ext>
             </a:extLst>
           </p:cNvPr>
@@ -25350,7 +25349,7 @@
           <p:cNvPr id="3" name="Content Placeholder 6">
             <a:extLst>
               <a:ext uri="{FF2B5EF4-FFF2-40B4-BE49-F238E27FC236}">
-                <a16:creationId xmlns="" xmlns:a16="http://schemas.microsoft.com/office/drawing/2014/main" id="{2A01A65B-D54F-AD53-7320-5D272BEC11D3}"/>
+                <a16:creationId xmlns:a16="http://schemas.microsoft.com/office/drawing/2014/main" xmlns="" id="{2A01A65B-D54F-AD53-7320-5D272BEC11D3}"/>
               </a:ext>
             </a:extLst>
           </p:cNvPr>
@@ -25451,7 +25450,7 @@
           <p:cNvPr id="5" name="Picture Placeholder 4">
             <a:extLst>
               <a:ext uri="{FF2B5EF4-FFF2-40B4-BE49-F238E27FC236}">
-                <a16:creationId xmlns="" xmlns:a16="http://schemas.microsoft.com/office/drawing/2014/main" id="{E724DBE4-044A-67D8-93C0-EB245AFBB297}"/>
+                <a16:creationId xmlns:a16="http://schemas.microsoft.com/office/drawing/2014/main" xmlns="" id="{E724DBE4-044A-67D8-93C0-EB245AFBB297}"/>
               </a:ext>
             </a:extLst>
           </p:cNvPr>
@@ -26395,7 +26394,7 @@
           <p:cNvPr id="6" name="Slide Number Placeholder 5">
             <a:extLst>
               <a:ext uri="{FF2B5EF4-FFF2-40B4-BE49-F238E27FC236}">
-                <a16:creationId xmlns="" xmlns:a16="http://schemas.microsoft.com/office/drawing/2014/main" id="{2FA893C5-3725-2BF8-B201-6C4123C13131}"/>
+                <a16:creationId xmlns:a16="http://schemas.microsoft.com/office/drawing/2014/main" xmlns="" id="{2FA893C5-3725-2BF8-B201-6C4123C13131}"/>
               </a:ext>
             </a:extLst>
           </p:cNvPr>
@@ -26440,7 +26439,7 @@
     </p:spTree>
     <p:extLst>
       <p:ext uri="{BB962C8B-B14F-4D97-AF65-F5344CB8AC3E}">
-        <p14:creationId xmlns="" xmlns:p14="http://schemas.microsoft.com/office/powerpoint/2010/main" val="4030094665"/>
+        <p14:creationId xmlns:p14="http://schemas.microsoft.com/office/powerpoint/2010/main" xmlns="" val="4030094665"/>
       </p:ext>
     </p:extLst>
   </p:cSld>
@@ -26449,7 +26448,7 @@
   </p:clrMapOvr>
   <p:extLst>
     <p:ext uri="{DCECCB84-F9BA-43D5-87BE-67443E8EF086}">
-      <p15:sldGuideLst xmlns="" xmlns:p15="http://schemas.microsoft.com/office/powerpoint/2012/main">
+      <p15:sldGuideLst xmlns:p15="http://schemas.microsoft.com/office/powerpoint/2012/main" xmlns="">
         <p15:guide id="1" orient="horz" pos="3984">
           <p15:clr>
             <a:srgbClr val="FBAE40"/>
@@ -26506,7 +26505,7 @@
           <p:cNvPr id="2" name="Title Placeholder 1">
             <a:extLst>
               <a:ext uri="{FF2B5EF4-FFF2-40B4-BE49-F238E27FC236}">
-                <a16:creationId xmlns="" xmlns:a16="http://schemas.microsoft.com/office/drawing/2014/main" id="{FF3B57D9-86AF-A333-72B5-F387677E3366}"/>
+                <a16:creationId xmlns:a16="http://schemas.microsoft.com/office/drawing/2014/main" xmlns="" id="{FF3B57D9-86AF-A333-72B5-F387677E3366}"/>
               </a:ext>
             </a:extLst>
           </p:cNvPr>
@@ -26545,7 +26544,7 @@
           <p:cNvPr id="3" name="Text Placeholder 2">
             <a:extLst>
               <a:ext uri="{FF2B5EF4-FFF2-40B4-BE49-F238E27FC236}">
-                <a16:creationId xmlns="" xmlns:a16="http://schemas.microsoft.com/office/drawing/2014/main" id="{6716097B-2AAF-BB62-EE1B-3B3DA29D35E4}"/>
+                <a16:creationId xmlns:a16="http://schemas.microsoft.com/office/drawing/2014/main" xmlns="" id="{6716097B-2AAF-BB62-EE1B-3B3DA29D35E4}"/>
               </a:ext>
             </a:extLst>
           </p:cNvPr>
@@ -26612,7 +26611,7 @@
           <p:cNvPr id="4" name="Date Placeholder 3">
             <a:extLst>
               <a:ext uri="{FF2B5EF4-FFF2-40B4-BE49-F238E27FC236}">
-                <a16:creationId xmlns="" xmlns:a16="http://schemas.microsoft.com/office/drawing/2014/main" id="{40E44B38-E59B-D511-CC7B-CC87760C7CAA}"/>
+                <a16:creationId xmlns:a16="http://schemas.microsoft.com/office/drawing/2014/main" xmlns="" id="{40E44B38-E59B-D511-CC7B-CC87760C7CAA}"/>
               </a:ext>
             </a:extLst>
           </p:cNvPr>
@@ -26653,7 +26652,7 @@
           <p:cNvPr id="5" name="Footer Placeholder 4">
             <a:extLst>
               <a:ext uri="{FF2B5EF4-FFF2-40B4-BE49-F238E27FC236}">
-                <a16:creationId xmlns="" xmlns:a16="http://schemas.microsoft.com/office/drawing/2014/main" id="{64C4DA96-9345-993B-EDB3-7477F7A187E0}"/>
+                <a16:creationId xmlns:a16="http://schemas.microsoft.com/office/drawing/2014/main" xmlns="" id="{64C4DA96-9345-993B-EDB3-7477F7A187E0}"/>
               </a:ext>
             </a:extLst>
           </p:cNvPr>
@@ -26694,7 +26693,7 @@
           <p:cNvPr id="6" name="Slide Number Placeholder 5">
             <a:extLst>
               <a:ext uri="{FF2B5EF4-FFF2-40B4-BE49-F238E27FC236}">
-                <a16:creationId xmlns="" xmlns:a16="http://schemas.microsoft.com/office/drawing/2014/main" id="{362B7E2D-2283-8730-5E1E-7F19B1CD941D}"/>
+                <a16:creationId xmlns:a16="http://schemas.microsoft.com/office/drawing/2014/main" xmlns="" id="{362B7E2D-2283-8730-5E1E-7F19B1CD941D}"/>
               </a:ext>
             </a:extLst>
           </p:cNvPr>
@@ -26741,7 +26740,7 @@
           <p:cNvPr id="8" name="Straight Connector 7">
             <a:extLst>
               <a:ext uri="{FF2B5EF4-FFF2-40B4-BE49-F238E27FC236}">
-                <a16:creationId xmlns="" xmlns:a16="http://schemas.microsoft.com/office/drawing/2014/main" id="{AA994521-4157-D242-5242-0C3BD99E8EA8}"/>
+                <a16:creationId xmlns:a16="http://schemas.microsoft.com/office/drawing/2014/main" xmlns="" id="{AA994521-4157-D242-5242-0C3BD99E8EA8}"/>
               </a:ext>
             </a:extLst>
           </p:cNvPr>
@@ -26783,7 +26782,7 @@
     </p:spTree>
     <p:extLst>
       <p:ext uri="{BB962C8B-B14F-4D97-AF65-F5344CB8AC3E}">
-        <p14:creationId xmlns="" xmlns:p14="http://schemas.microsoft.com/office/powerpoint/2010/main" val="1636003154"/>
+        <p14:creationId xmlns:p14="http://schemas.microsoft.com/office/powerpoint/2010/main" xmlns="" val="1636003154"/>
       </p:ext>
     </p:extLst>
   </p:cSld>
@@ -27096,7 +27095,7 @@
         <p:cNvPr id="1" name="">
           <a:extLst>
             <a:ext uri="{FF2B5EF4-FFF2-40B4-BE49-F238E27FC236}">
-              <a16:creationId xmlns="" xmlns:a16="http://schemas.microsoft.com/office/drawing/2014/main" id="{E7092719-D5D9-FEC2-B9D6-942BD02028E8}"/>
+              <a16:creationId xmlns:a16="http://schemas.microsoft.com/office/drawing/2014/main" xmlns="" id="{E7092719-D5D9-FEC2-B9D6-942BD02028E8}"/>
             </a:ext>
           </a:extLst>
         </p:cNvPr>
@@ -27116,7 +27115,7 @@
           <p:cNvPr id="3" name="Title 2">
             <a:extLst>
               <a:ext uri="{FF2B5EF4-FFF2-40B4-BE49-F238E27FC236}">
-                <a16:creationId xmlns="" xmlns:a16="http://schemas.microsoft.com/office/drawing/2014/main" id="{B45A4A65-E8B8-40CF-7ABD-97EA8FA97521}"/>
+                <a16:creationId xmlns:a16="http://schemas.microsoft.com/office/drawing/2014/main" xmlns="" id="{B45A4A65-E8B8-40CF-7ABD-97EA8FA97521}"/>
               </a:ext>
             </a:extLst>
           </p:cNvPr>
@@ -27152,13 +27151,20 @@
     </p:spTree>
     <p:extLst>
       <p:ext uri="{BB962C8B-B14F-4D97-AF65-F5344CB8AC3E}">
-        <p14:creationId xmlns="" xmlns:p14="http://schemas.microsoft.com/office/powerpoint/2010/main" val="1338167130"/>
+        <p14:creationId xmlns:p14="http://schemas.microsoft.com/office/powerpoint/2010/main" xmlns="" val="1338167130"/>
       </p:ext>
     </p:extLst>
   </p:cSld>
   <p:clrMapOvr>
     <a:masterClrMapping/>
   </p:clrMapOvr>
+  <p:timing>
+    <p:tnLst>
+      <p:par>
+        <p:cTn id="1" dur="indefinite" restart="never" nodeType="tmRoot"/>
+      </p:par>
+    </p:tnLst>
+  </p:timing>
 </p:sld>
 </file>
 
@@ -27184,7 +27190,7 @@
           <p:cNvPr id="2" name="Title 1">
             <a:extLst>
               <a:ext uri="{FF2B5EF4-FFF2-40B4-BE49-F238E27FC236}">
-                <a16:creationId xmlns="" xmlns:a16="http://schemas.microsoft.com/office/drawing/2014/main" id="{2403EE45-3924-5A20-4FDE-7EA6BBEBD06F}"/>
+                <a16:creationId xmlns:a16="http://schemas.microsoft.com/office/drawing/2014/main" xmlns="" id="{2403EE45-3924-5A20-4FDE-7EA6BBEBD06F}"/>
               </a:ext>
             </a:extLst>
           </p:cNvPr>
@@ -27197,8 +27203,8 @@
         </p:nvSpPr>
         <p:spPr>
           <a:xfrm>
-            <a:off x="1181100" y="914400"/>
-            <a:ext cx="5364480" cy="5029200"/>
+            <a:off x="914400" y="914400"/>
+            <a:ext cx="5631180" cy="5029200"/>
           </a:xfrm>
         </p:spPr>
         <p:txBody>
@@ -27207,18 +27213,18 @@
           <a:p>
             <a:pPr algn="just"/>
             <a:r>
-              <a:rPr lang="ru-RU" sz="4400" dirty="0" smtClean="0"/>
+              <a:rPr lang="ru-RU" sz="3600" dirty="0" smtClean="0"/>
               <a:t>Цель проекта – создание </a:t>
             </a:r>
             <a:r>
-              <a:rPr lang="ru-RU" sz="4400" dirty="0" err="1" smtClean="0"/>
+              <a:rPr lang="ru-RU" sz="3600" dirty="0" err="1" smtClean="0"/>
               <a:t>телеграм</a:t>
             </a:r>
             <a:r>
-              <a:rPr lang="ru-RU" sz="4400" dirty="0" smtClean="0"/>
+              <a:rPr lang="ru-RU" sz="3600" dirty="0" smtClean="0"/>
               <a:t> бота, в котором можно было бы всегда получать актуальную погоду в своем городе.</a:t>
             </a:r>
-            <a:endParaRPr lang="en-US" sz="4400" dirty="0"/>
+            <a:endParaRPr lang="en-US" sz="3600" dirty="0"/>
           </a:p>
         </p:txBody>
       </p:sp>
@@ -27244,13 +27250,20 @@
     </p:spTree>
     <p:extLst>
       <p:ext uri="{BB962C8B-B14F-4D97-AF65-F5344CB8AC3E}">
-        <p14:creationId xmlns="" xmlns:p14="http://schemas.microsoft.com/office/powerpoint/2010/main" val="2222324472"/>
+        <p14:creationId xmlns:p14="http://schemas.microsoft.com/office/powerpoint/2010/main" xmlns="" val="2222324472"/>
       </p:ext>
     </p:extLst>
   </p:cSld>
   <p:clrMapOvr>
     <a:masterClrMapping/>
   </p:clrMapOvr>
+  <p:timing>
+    <p:tnLst>
+      <p:par>
+        <p:cTn id="1" dur="indefinite" restart="never" nodeType="tmRoot"/>
+      </p:par>
+    </p:tnLst>
+  </p:timing>
 </p:sld>
 </file>
 
@@ -27284,7 +27297,7 @@
           <p:cNvPr id="3" name="Title 2">
             <a:extLst>
               <a:ext uri="{FF2B5EF4-FFF2-40B4-BE49-F238E27FC236}">
-                <a16:creationId xmlns="" xmlns:a16="http://schemas.microsoft.com/office/drawing/2014/main" id="{61377AF6-2477-81EC-D1BC-43FD72DF18F6}"/>
+                <a16:creationId xmlns:a16="http://schemas.microsoft.com/office/drawing/2014/main" xmlns="" id="{61377AF6-2477-81EC-D1BC-43FD72DF18F6}"/>
               </a:ext>
             </a:extLst>
           </p:cNvPr>
@@ -27321,7 +27334,7 @@
         </p:nvSpPr>
         <p:spPr>
           <a:xfrm>
-            <a:off x="5890260" y="2796540"/>
+            <a:off x="5608320" y="2796540"/>
             <a:ext cx="4221480" cy="2246769"/>
           </a:xfrm>
           <a:prstGeom prst="rect">
@@ -27352,13 +27365,7 @@
               <a:rPr lang="en-US" sz="2800" dirty="0" smtClean="0">
                 <a:latin typeface="Sagona Book (Заголовки)"/>
               </a:rPr>
-              <a:t> </a:t>
-            </a:r>
-            <a:r>
-              <a:rPr lang="en-US" sz="2800" dirty="0" smtClean="0">
-                <a:latin typeface="Sagona Book (Заголовки)"/>
-              </a:rPr>
-              <a:t>API </a:t>
+              <a:t> API </a:t>
             </a:r>
             <a:r>
               <a:rPr lang="ru-RU" sz="2800" dirty="0" smtClean="0">
@@ -27372,28 +27379,47 @@
           </a:p>
         </p:txBody>
       </p:sp>
-      <p:sp>
-        <p:nvSpPr>
-          <p:cNvPr id="14" name="Рисунок 13"/>
-          <p:cNvSpPr>
-            <a:spLocks noGrp="1"/>
-          </p:cNvSpPr>
+      <p:pic>
+        <p:nvPicPr>
+          <p:cNvPr id="5" name="Рисунок 4" descr="something.jpg"/>
+          <p:cNvPicPr>
+            <a:picLocks noGrp="1" noChangeAspect="1"/>
+          </p:cNvPicPr>
           <p:nvPr>
             <p:ph type="pic" sz="quarter" idx="11"/>
           </p:nvPr>
-        </p:nvSpPr>
-        <p:spPr/>
-      </p:sp>
+        </p:nvPicPr>
+        <p:blipFill>
+          <a:blip r:embed="rId3"/>
+          <a:srcRect l="24094" r="30866"/>
+          <a:stretch>
+            <a:fillRect/>
+          </a:stretch>
+        </p:blipFill>
+        <p:spPr>
+          <a:xfrm>
+            <a:off x="-48881" y="261780"/>
+            <a:ext cx="4471134" cy="6596220"/>
+          </a:xfrm>
+        </p:spPr>
+      </p:pic>
     </p:spTree>
     <p:extLst>
       <p:ext uri="{BB962C8B-B14F-4D97-AF65-F5344CB8AC3E}">
-        <p14:creationId xmlns="" xmlns:p14="http://schemas.microsoft.com/office/powerpoint/2010/main" val="520000563"/>
+        <p14:creationId xmlns:p14="http://schemas.microsoft.com/office/powerpoint/2010/main" xmlns="" val="520000563"/>
       </p:ext>
     </p:extLst>
   </p:cSld>
   <p:clrMapOvr>
     <a:masterClrMapping/>
   </p:clrMapOvr>
+  <p:timing>
+    <p:tnLst>
+      <p:par>
+        <p:cTn id="1" dur="indefinite" restart="never" nodeType="tmRoot"/>
+      </p:par>
+    </p:tnLst>
+  </p:timing>
 </p:sld>
 </file>
 
@@ -27419,7 +27445,7 @@
           <p:cNvPr id="19" name="Title 18">
             <a:extLst>
               <a:ext uri="{FF2B5EF4-FFF2-40B4-BE49-F238E27FC236}">
-                <a16:creationId xmlns="" xmlns:a16="http://schemas.microsoft.com/office/drawing/2014/main" id="{A7BE12AD-D808-BDE0-3EB8-5BC50B1D8474}"/>
+                <a16:creationId xmlns:a16="http://schemas.microsoft.com/office/drawing/2014/main" xmlns="" id="{A7BE12AD-D808-BDE0-3EB8-5BC50B1D8474}"/>
               </a:ext>
             </a:extLst>
           </p:cNvPr>
@@ -27430,14 +27456,19 @@
             <p:ph type="title"/>
           </p:nvPr>
         </p:nvSpPr>
-        <p:spPr/>
+        <p:spPr>
+          <a:xfrm>
+            <a:off x="914400" y="914400"/>
+            <a:ext cx="7534656" cy="746760"/>
+          </a:xfrm>
+        </p:spPr>
         <p:txBody>
           <a:bodyPr/>
           <a:lstStyle/>
           <a:p>
             <a:r>
-              <a:rPr lang="en-US" sz="3200" dirty="0"/>
-              <a:t>engaging the audience</a:t>
+              <a:rPr lang="ru-RU" dirty="0" smtClean="0"/>
+              <a:t>Что может бот?</a:t>
             </a:r>
             <a:endParaRPr lang="en-US" dirty="0"/>
           </a:p>
@@ -27448,7 +27479,7 @@
           <p:cNvPr id="8" name="Content Placeholder 7">
             <a:extLst>
               <a:ext uri="{FF2B5EF4-FFF2-40B4-BE49-F238E27FC236}">
-                <a16:creationId xmlns="" xmlns:a16="http://schemas.microsoft.com/office/drawing/2014/main" id="{BCFDA37B-399A-B9F0-7A7D-2A891EB7FFA6}"/>
+                <a16:creationId xmlns:a16="http://schemas.microsoft.com/office/drawing/2014/main" xmlns="" id="{BCFDA37B-399A-B9F0-7A7D-2A891EB7FFA6}"/>
               </a:ext>
             </a:extLst>
           </p:cNvPr>
@@ -27461,7 +27492,7 @@
         </p:nvSpPr>
         <p:spPr>
           <a:xfrm>
-            <a:off x="914400" y="2039112"/>
+            <a:off x="1257300" y="2008632"/>
             <a:ext cx="7150608" cy="3356576"/>
           </a:xfrm>
         </p:spPr>
@@ -27469,28 +27500,51 @@
           <a:bodyPr/>
           <a:lstStyle/>
           <a:p>
+            <a:endParaRPr lang="en-US" dirty="0"/>
+          </a:p>
+          <a:p>
+            <a:pPr algn="just"/>
             <a:r>
-              <a:rPr lang="en-US" dirty="0"/>
-              <a:t>Make eye contact with your audience to create a sense of intimacy and involvement</a:t>
+              <a:rPr lang="ru-RU" sz="2400" dirty="0" smtClean="0"/>
+              <a:t>Бот может отправлять Вам актуальную погоду в любом городе мира.</a:t>
             </a:r>
           </a:p>
           <a:p>
+            <a:pPr algn="just"/>
             <a:r>
-              <a:rPr lang="en-US" dirty="0"/>
-              <a:t>Weave relatable stories into your presentation using narratives that make your message memorable and impactful</a:t>
+              <a:rPr lang="ru-RU" sz="2400" dirty="0" smtClean="0"/>
+              <a:t>Существует возможность подписаться на уведомления о погоде.</a:t>
             </a:r>
           </a:p>
           <a:p>
+            <a:pPr algn="just"/>
             <a:r>
-              <a:rPr lang="en-US" dirty="0"/>
-              <a:t>Encourage questions and provide thoughtful responses to enhance audience participation</a:t>
+              <a:rPr lang="ru-RU" sz="2400" dirty="0" smtClean="0"/>
+              <a:t>Можно удалять старые</a:t>
             </a:r>
+            <a:r>
+              <a:rPr lang="ru-RU" sz="2400" dirty="0" smtClean="0"/>
+              <a:t> </a:t>
+            </a:r>
+            <a:r>
+              <a:rPr lang="ru-RU" sz="2400" dirty="0" smtClean="0"/>
+              <a:t>и добавлять </a:t>
+            </a:r>
+            <a:r>
+              <a:rPr lang="ru-RU" sz="2400" dirty="0" smtClean="0"/>
+              <a:t>новые подписки</a:t>
+            </a:r>
+            <a:r>
+              <a:rPr lang="ru-RU" sz="2400" dirty="0" smtClean="0"/>
+              <a:t>. Их может быть сколько угодно.</a:t>
+            </a:r>
+            <a:endParaRPr lang="ru-RU" sz="2400" dirty="0" smtClean="0"/>
           </a:p>
           <a:p>
-            <a:r>
-              <a:rPr lang="en-US" dirty="0"/>
-              <a:t>Use live polls or surveys to gather audience opinions, promoting engagement and making sure the audience feel involved</a:t>
-            </a:r>
+            <a:endParaRPr lang="ru-RU" dirty="0" smtClean="0"/>
+          </a:p>
+          <a:p>
+            <a:endParaRPr lang="en-US" dirty="0"/>
           </a:p>
         </p:txBody>
       </p:sp>
@@ -27499,7 +27553,7 @@
           <p:cNvPr id="3" name="Slide Number Placeholder 2">
             <a:extLst>
               <a:ext uri="{FF2B5EF4-FFF2-40B4-BE49-F238E27FC236}">
-                <a16:creationId xmlns="" xmlns:a16="http://schemas.microsoft.com/office/drawing/2014/main" id="{50CD348E-9357-0442-4555-AF6B4AFE34B6}"/>
+                <a16:creationId xmlns:a16="http://schemas.microsoft.com/office/drawing/2014/main" xmlns="" id="{50CD348E-9357-0442-4555-AF6B4AFE34B6}"/>
               </a:ext>
             </a:extLst>
           </p:cNvPr>
@@ -27532,13 +27586,20 @@
     </p:spTree>
     <p:extLst>
       <p:ext uri="{BB962C8B-B14F-4D97-AF65-F5344CB8AC3E}">
-        <p14:creationId xmlns="" xmlns:p14="http://schemas.microsoft.com/office/powerpoint/2010/main" val="1966913227"/>
+        <p14:creationId xmlns:p14="http://schemas.microsoft.com/office/powerpoint/2010/main" xmlns="" val="1966913227"/>
       </p:ext>
     </p:extLst>
   </p:cSld>
   <p:clrMapOvr>
     <a:masterClrMapping/>
   </p:clrMapOvr>
+  <p:timing>
+    <p:tnLst>
+      <p:par>
+        <p:cTn id="1" dur="indefinite" restart="never" nodeType="tmRoot"/>
+      </p:par>
+    </p:tnLst>
+  </p:timing>
 </p:sld>
 </file>
 
@@ -27572,7 +27633,7 @@
           <p:cNvPr id="11" name="Title 2">
             <a:extLst>
               <a:ext uri="{FF2B5EF4-FFF2-40B4-BE49-F238E27FC236}">
-                <a16:creationId xmlns="" xmlns:a16="http://schemas.microsoft.com/office/drawing/2014/main" id="{2A3D95EF-8A67-7F71-37EF-9EB02511B163}"/>
+                <a16:creationId xmlns:a16="http://schemas.microsoft.com/office/drawing/2014/main" xmlns="" id="{2A3D95EF-8A67-7F71-37EF-9EB02511B163}"/>
               </a:ext>
             </a:extLst>
           </p:cNvPr>
@@ -27585,8 +27646,8 @@
         </p:nvSpPr>
         <p:spPr>
           <a:xfrm>
-            <a:off x="914400" y="914400"/>
-            <a:ext cx="10360152" cy="2843784"/>
+            <a:off x="998220" y="1013460"/>
+            <a:ext cx="10360152" cy="838200"/>
           </a:xfrm>
         </p:spPr>
         <p:txBody>
@@ -27594,99 +27655,8 @@
           <a:lstStyle/>
           <a:p>
             <a:r>
-              <a:rPr lang="en-US" dirty="0"/>
-              <a:t>selecting visual aids</a:t>
-            </a:r>
-          </a:p>
-        </p:txBody>
-      </p:sp>
-      <p:sp>
-        <p:nvSpPr>
-          <p:cNvPr id="15" name="Text Placeholder 14">
-            <a:extLst>
-              <a:ext uri="{FF2B5EF4-FFF2-40B4-BE49-F238E27FC236}">
-                <a16:creationId xmlns="" xmlns:a16="http://schemas.microsoft.com/office/drawing/2014/main" id="{C7846849-DC0A-EE3B-2E5E-D669EC1273D6}"/>
-              </a:ext>
-            </a:extLst>
-          </p:cNvPr>
-          <p:cNvSpPr>
-            <a:spLocks noGrp="1"/>
-          </p:cNvSpPr>
-          <p:nvPr>
-            <p:ph type="body" sz="quarter" idx="13"/>
-          </p:nvPr>
-        </p:nvSpPr>
-        <p:spPr>
-          <a:xfrm>
-            <a:off x="2041114" y="3825875"/>
-            <a:ext cx="8109772" cy="2644775"/>
-          </a:xfrm>
-        </p:spPr>
-        <p:txBody>
-          <a:bodyPr/>
-          <a:lstStyle/>
-          <a:p>
-            <a:r>
-              <a:rPr lang="en-US" dirty="0"/>
-              <a:t>ENHANCING YOUR PRESENTATION</a:t>
-            </a:r>
-          </a:p>
-        </p:txBody>
-      </p:sp>
-    </p:spTree>
-    <p:extLst>
-      <p:ext uri="{BB962C8B-B14F-4D97-AF65-F5344CB8AC3E}">
-        <p14:creationId xmlns="" xmlns:p14="http://schemas.microsoft.com/office/powerpoint/2010/main" val="1096717490"/>
-      </p:ext>
-    </p:extLst>
-  </p:cSld>
-  <p:clrMapOvr>
-    <a:masterClrMapping/>
-  </p:clrMapOvr>
-</p:sld>
-</file>
-
-<file path=ppt/slides/slide6.xml><?xml version="1.0" encoding="utf-8"?>
-<p:sld xmlns:a="http://schemas.openxmlformats.org/drawingml/2006/main" xmlns:r="http://schemas.openxmlformats.org/officeDocument/2006/relationships" xmlns:p="http://schemas.openxmlformats.org/presentationml/2006/main">
-  <p:cSld>
-    <p:spTree>
-      <p:nvGrpSpPr>
-        <p:cNvPr id="1" name=""/>
-        <p:cNvGrpSpPr/>
-        <p:nvPr/>
-      </p:nvGrpSpPr>
-      <p:grpSpPr>
-        <a:xfrm>
-          <a:off x="0" y="0"/>
-          <a:ext cx="0" cy="0"/>
-          <a:chOff x="0" y="0"/>
-          <a:chExt cx="0" cy="0"/>
-        </a:xfrm>
-      </p:grpSpPr>
-      <p:sp>
-        <p:nvSpPr>
-          <p:cNvPr id="17" name="Title 16">
-            <a:extLst>
-              <a:ext uri="{FF2B5EF4-FFF2-40B4-BE49-F238E27FC236}">
-                <a16:creationId xmlns="" xmlns:a16="http://schemas.microsoft.com/office/drawing/2014/main" id="{96E3FD31-D19A-BFEB-821F-C00103830DC9}"/>
-              </a:ext>
-            </a:extLst>
-          </p:cNvPr>
-          <p:cNvSpPr>
-            <a:spLocks noGrp="1"/>
-          </p:cNvSpPr>
-          <p:nvPr>
-            <p:ph type="title"/>
-          </p:nvPr>
-        </p:nvSpPr>
-        <p:spPr/>
-        <p:txBody>
-          <a:bodyPr/>
-          <a:lstStyle/>
-          <a:p>
-            <a:r>
-              <a:rPr lang="en-US" sz="3200" dirty="0"/>
-              <a:t>speaking impact </a:t>
+              <a:rPr lang="ru-RU" dirty="0" smtClean="0"/>
+              <a:t>Возможные доработки</a:t>
             </a:r>
             <a:endParaRPr lang="en-US" dirty="0"/>
           </a:p>
@@ -27694,514 +27664,108 @@
       </p:sp>
       <p:sp>
         <p:nvSpPr>
-          <p:cNvPr id="3" name="Content Placeholder 2">
-            <a:extLst>
-              <a:ext uri="{FF2B5EF4-FFF2-40B4-BE49-F238E27FC236}">
-                <a16:creationId xmlns="" xmlns:a16="http://schemas.microsoft.com/office/drawing/2014/main" id="{CF3ADB94-FC21-07C5-1FC9-E729C5DEDFC6}"/>
-              </a:ext>
-            </a:extLst>
-          </p:cNvPr>
-          <p:cNvSpPr>
-            <a:spLocks noGrp="1"/>
-          </p:cNvSpPr>
-          <p:nvPr>
-            <p:ph sz="quarter" idx="12"/>
-          </p:nvPr>
+          <p:cNvPr id="10" name="TextBox 9"/>
+          <p:cNvSpPr txBox="1"/>
+          <p:nvPr/>
         </p:nvSpPr>
         <p:spPr>
           <a:xfrm>
-            <a:off x="914399" y="2039111"/>
-            <a:ext cx="2816352" cy="3840480"/>
+            <a:off x="2644140" y="2141220"/>
+            <a:ext cx="6903720" cy="3693319"/>
           </a:xfrm>
+          <a:prstGeom prst="rect">
+            <a:avLst/>
+          </a:prstGeom>
+          <a:noFill/>
         </p:spPr>
         <p:txBody>
-          <a:bodyPr/>
+          <a:bodyPr wrap="square" rtlCol="0">
+            <a:spAutoFit/>
+          </a:bodyPr>
           <a:lstStyle/>
           <a:p>
+            <a:pPr lvl="1" algn="just">
+              <a:buFont typeface="Arial" pitchFamily="34" charset="0"/>
+              <a:buChar char="•"/>
+            </a:pPr>
             <a:r>
-              <a:rPr lang="en-US" dirty="0"/>
-              <a:t>Learn to infuse energy into your delivery to leave a lasting impression</a:t>
+              <a:rPr lang="ru-RU" dirty="0" smtClean="0"/>
+              <a:t> </a:t>
+            </a:r>
+            <a:r>
+              <a:rPr lang="ru-RU" sz="2200" dirty="0" smtClean="0"/>
+              <a:t>Предупреждение о резкой смене погоды, например, при похолодании, урагане или наводнении.</a:t>
             </a:r>
           </a:p>
           <a:p>
+            <a:pPr lvl="1" algn="just"/>
+            <a:endParaRPr lang="ru-RU" sz="2200" dirty="0" smtClean="0"/>
+          </a:p>
+          <a:p>
+            <a:pPr lvl="1">
+              <a:buFont typeface="Arial" pitchFamily="34" charset="0"/>
+              <a:buChar char="•"/>
+            </a:pPr>
             <a:r>
-              <a:rPr lang="en-US" dirty="0"/>
-              <a:t>One of the goals of effective communication is to motivate your audience</a:t>
+              <a:rPr lang="ru-RU" sz="2200" dirty="0" smtClean="0"/>
+              <a:t> Возможность выбора языка.</a:t>
             </a:r>
           </a:p>
           <a:p>
-            <a:endParaRPr lang="en-US" dirty="0"/>
+            <a:pPr lvl="1">
+              <a:buFont typeface="Arial" pitchFamily="34" charset="0"/>
+              <a:buChar char="•"/>
+            </a:pPr>
+            <a:endParaRPr lang="ru-RU" sz="2200" dirty="0" smtClean="0"/>
           </a:p>
-        </p:txBody>
-      </p:sp>
-      <p:graphicFrame>
-        <p:nvGraphicFramePr>
-          <p:cNvPr id="6" name="Table 4">
-            <a:extLst>
-              <a:ext uri="{FF2B5EF4-FFF2-40B4-BE49-F238E27FC236}">
-                <a16:creationId xmlns="" xmlns:a16="http://schemas.microsoft.com/office/drawing/2014/main" id="{D3F53A55-1F2B-EB7F-3E43-C43170D77989}"/>
-              </a:ext>
-            </a:extLst>
-          </p:cNvPr>
-          <p:cNvGraphicFramePr>
-            <a:graphicFrameLocks noGrp="1"/>
-          </p:cNvGraphicFramePr>
-          <p:nvPr>
-            <p:ph sz="quarter" idx="13"/>
-            <p:extLst>
-              <p:ext uri="{D42A27DB-BD31-4B8C-83A1-F6EECF244321}">
-                <p14:modId xmlns="" xmlns:p14="http://schemas.microsoft.com/office/powerpoint/2010/main" val="1332799362"/>
-              </p:ext>
-            </p:extLst>
-          </p:nvPr>
-        </p:nvGraphicFramePr>
-        <p:xfrm>
-          <a:off x="4097338" y="2038350"/>
-          <a:ext cx="7180262" cy="4151435"/>
-        </p:xfrm>
-        <a:graphic>
-          <a:graphicData uri="http://schemas.openxmlformats.org/drawingml/2006/table">
-            <a:tbl>
-              <a:tblPr firstRow="1" bandRow="1">
-                <a:tableStyleId>{C4B1156A-380E-4F78-BDF5-A606A8083BF9}</a:tableStyleId>
-              </a:tblPr>
-              <a:tblGrid>
-                <a:gridCol w="2383731">
-                  <a:extLst>
-                    <a:ext uri="{9D8B030D-6E8A-4147-A177-3AD203B41FA5}">
-                      <a16:colId xmlns="" xmlns:a16="http://schemas.microsoft.com/office/drawing/2014/main" val="1689330750"/>
-                    </a:ext>
-                  </a:extLst>
-                </a:gridCol>
-                <a:gridCol w="2077175">
-                  <a:extLst>
-                    <a:ext uri="{9D8B030D-6E8A-4147-A177-3AD203B41FA5}">
-                      <a16:colId xmlns="" xmlns:a16="http://schemas.microsoft.com/office/drawing/2014/main" val="2660631934"/>
-                    </a:ext>
-                  </a:extLst>
-                </a:gridCol>
-                <a:gridCol w="1359678">
-                  <a:extLst>
-                    <a:ext uri="{9D8B030D-6E8A-4147-A177-3AD203B41FA5}">
-                      <a16:colId xmlns="" xmlns:a16="http://schemas.microsoft.com/office/drawing/2014/main" val="3909717689"/>
-                    </a:ext>
-                  </a:extLst>
-                </a:gridCol>
-                <a:gridCol w="1359678">
-                  <a:extLst>
-                    <a:ext uri="{9D8B030D-6E8A-4147-A177-3AD203B41FA5}">
-                      <a16:colId xmlns="" xmlns:a16="http://schemas.microsoft.com/office/drawing/2014/main" val="1603189107"/>
-                    </a:ext>
-                  </a:extLst>
-                </a:gridCol>
-              </a:tblGrid>
-              <a:tr h="618076">
-                <a:tc>
-                  <a:txBody>
-                    <a:bodyPr/>
-                    <a:lstStyle/>
-                    <a:p>
-                      <a:r>
-                        <a:rPr lang="en-US" sz="2000" b="0" dirty="0"/>
-                        <a:t>METRIC</a:t>
-                      </a:r>
-                    </a:p>
-                  </a:txBody>
-                  <a:tcPr anchor="ctr"/>
-                </a:tc>
-                <a:tc>
-                  <a:txBody>
-                    <a:bodyPr/>
-                    <a:lstStyle/>
-                    <a:p>
-                      <a:r>
-                        <a:rPr lang="en-US" sz="2000" b="0" dirty="0"/>
-                        <a:t>MEASUREMENT</a:t>
-                      </a:r>
-                    </a:p>
-                  </a:txBody>
-                  <a:tcPr anchor="ctr"/>
-                </a:tc>
-                <a:tc>
-                  <a:txBody>
-                    <a:bodyPr/>
-                    <a:lstStyle/>
-                    <a:p>
-                      <a:r>
-                        <a:rPr lang="en-US" sz="2000" b="0" dirty="0"/>
-                        <a:t>TARGET</a:t>
-                      </a:r>
-                    </a:p>
-                  </a:txBody>
-                  <a:tcPr anchor="ctr"/>
-                </a:tc>
-                <a:tc>
-                  <a:txBody>
-                    <a:bodyPr/>
-                    <a:lstStyle/>
-                    <a:p>
-                      <a:r>
-                        <a:rPr lang="en-US" sz="2000" b="0" dirty="0"/>
-                        <a:t>ACTUAL</a:t>
-                      </a:r>
-                    </a:p>
-                  </a:txBody>
-                  <a:tcPr anchor="ctr"/>
-                </a:tc>
-                <a:extLst>
-                  <a:ext uri="{0D108BD9-81ED-4DB2-BD59-A6C34878D82A}">
-                    <a16:rowId xmlns="" xmlns:a16="http://schemas.microsoft.com/office/drawing/2014/main" val="479928716"/>
-                  </a:ext>
-                </a:extLst>
-              </a:tr>
-              <a:tr h="618076">
-                <a:tc>
-                  <a:txBody>
-                    <a:bodyPr/>
-                    <a:lstStyle/>
-                    <a:p>
-                      <a:r>
-                        <a:rPr lang="en-US" sz="2000" b="0" dirty="0"/>
-                        <a:t>Audience attendance</a:t>
-                      </a:r>
-                    </a:p>
-                  </a:txBody>
-                  <a:tcPr anchor="ctr"/>
-                </a:tc>
-                <a:tc>
-                  <a:txBody>
-                    <a:bodyPr/>
-                    <a:lstStyle/>
-                    <a:p>
-                      <a:r>
-                        <a:rPr lang="en-US" sz="2000" b="0" dirty="0"/>
-                        <a:t># of attendees</a:t>
-                      </a:r>
-                    </a:p>
-                  </a:txBody>
-                  <a:tcPr anchor="ctr"/>
-                </a:tc>
-                <a:tc>
-                  <a:txBody>
-                    <a:bodyPr/>
-                    <a:lstStyle/>
-                    <a:p>
-                      <a:r>
-                        <a:rPr lang="en-US" sz="2000" b="0" dirty="0"/>
-                        <a:t>150</a:t>
-                      </a:r>
-                    </a:p>
-                  </a:txBody>
-                  <a:tcPr anchor="ctr"/>
-                </a:tc>
-                <a:tc>
-                  <a:txBody>
-                    <a:bodyPr/>
-                    <a:lstStyle/>
-                    <a:p>
-                      <a:r>
-                        <a:rPr lang="en-US" sz="2000" b="0" dirty="0"/>
-                        <a:t>120</a:t>
-                      </a:r>
-                    </a:p>
-                  </a:txBody>
-                  <a:tcPr anchor="ctr"/>
-                </a:tc>
-                <a:extLst>
-                  <a:ext uri="{0D108BD9-81ED-4DB2-BD59-A6C34878D82A}">
-                    <a16:rowId xmlns="" xmlns:a16="http://schemas.microsoft.com/office/drawing/2014/main" val="1760208656"/>
-                  </a:ext>
-                </a:extLst>
-              </a:tr>
-              <a:tr h="618076">
-                <a:tc>
-                  <a:txBody>
-                    <a:bodyPr/>
-                    <a:lstStyle/>
-                    <a:p>
-                      <a:r>
-                        <a:rPr lang="en-US" sz="2000" b="0" dirty="0"/>
-                        <a:t>Engagement duration</a:t>
-                      </a:r>
-                    </a:p>
-                  </a:txBody>
-                  <a:tcPr anchor="ctr"/>
-                </a:tc>
-                <a:tc>
-                  <a:txBody>
-                    <a:bodyPr/>
-                    <a:lstStyle/>
-                    <a:p>
-                      <a:r>
-                        <a:rPr lang="en-US" sz="2000" b="0" dirty="0"/>
-                        <a:t>Minutes</a:t>
-                      </a:r>
-                    </a:p>
-                  </a:txBody>
-                  <a:tcPr anchor="ctr"/>
-                </a:tc>
-                <a:tc>
-                  <a:txBody>
-                    <a:bodyPr/>
-                    <a:lstStyle/>
-                    <a:p>
-                      <a:r>
-                        <a:rPr lang="en-US" sz="2000" b="0" dirty="0"/>
-                        <a:t>60</a:t>
-                      </a:r>
-                    </a:p>
-                  </a:txBody>
-                  <a:tcPr anchor="ctr"/>
-                </a:tc>
-                <a:tc>
-                  <a:txBody>
-                    <a:bodyPr/>
-                    <a:lstStyle/>
-                    <a:p>
-                      <a:r>
-                        <a:rPr lang="en-US" sz="2000" b="0" dirty="0"/>
-                        <a:t>75</a:t>
-                      </a:r>
-                    </a:p>
-                  </a:txBody>
-                  <a:tcPr anchor="ctr"/>
-                </a:tc>
-                <a:extLst>
-                  <a:ext uri="{0D108BD9-81ED-4DB2-BD59-A6C34878D82A}">
-                    <a16:rowId xmlns="" xmlns:a16="http://schemas.microsoft.com/office/drawing/2014/main" val="3634243071"/>
-                  </a:ext>
-                </a:extLst>
-              </a:tr>
-              <a:tr h="618076">
-                <a:tc>
-                  <a:txBody>
-                    <a:bodyPr/>
-                    <a:lstStyle/>
-                    <a:p>
-                      <a:r>
-                        <a:rPr lang="en-US" sz="2000" b="0" dirty="0"/>
-                        <a:t>Q&amp;A interaction</a:t>
-                      </a:r>
-                    </a:p>
-                  </a:txBody>
-                  <a:tcPr anchor="ctr"/>
-                </a:tc>
-                <a:tc>
-                  <a:txBody>
-                    <a:bodyPr/>
-                    <a:lstStyle/>
-                    <a:p>
-                      <a:r>
-                        <a:rPr lang="en-US" sz="2000" b="0" dirty="0"/>
-                        <a:t># of questions</a:t>
-                      </a:r>
-                    </a:p>
-                  </a:txBody>
-                  <a:tcPr anchor="ctr"/>
-                </a:tc>
-                <a:tc>
-                  <a:txBody>
-                    <a:bodyPr/>
-                    <a:lstStyle/>
-                    <a:p>
-                      <a:r>
-                        <a:rPr lang="en-US" sz="2000" b="0" dirty="0"/>
-                        <a:t>10</a:t>
-                      </a:r>
-                    </a:p>
-                  </a:txBody>
-                  <a:tcPr anchor="ctr"/>
-                </a:tc>
-                <a:tc>
-                  <a:txBody>
-                    <a:bodyPr/>
-                    <a:lstStyle/>
-                    <a:p>
-                      <a:r>
-                        <a:rPr lang="en-US" sz="2000" b="0" dirty="0"/>
-                        <a:t>15</a:t>
-                      </a:r>
-                    </a:p>
-                  </a:txBody>
-                  <a:tcPr anchor="ctr"/>
-                </a:tc>
-                <a:extLst>
-                  <a:ext uri="{0D108BD9-81ED-4DB2-BD59-A6C34878D82A}">
-                    <a16:rowId xmlns="" xmlns:a16="http://schemas.microsoft.com/office/drawing/2014/main" val="415808797"/>
-                  </a:ext>
-                </a:extLst>
-              </a:tr>
-              <a:tr h="618076">
-                <a:tc>
-                  <a:txBody>
-                    <a:bodyPr/>
-                    <a:lstStyle/>
-                    <a:p>
-                      <a:r>
-                        <a:rPr lang="en-US" sz="2000" b="0" dirty="0"/>
-                        <a:t>Positive feedback</a:t>
-                      </a:r>
-                    </a:p>
-                  </a:txBody>
-                  <a:tcPr anchor="ctr"/>
-                </a:tc>
-                <a:tc>
-                  <a:txBody>
-                    <a:bodyPr/>
-                    <a:lstStyle/>
-                    <a:p>
-                      <a:r>
-                        <a:rPr lang="en-US" sz="2000" b="0" dirty="0"/>
-                        <a:t>Percentage (%)</a:t>
-                      </a:r>
-                    </a:p>
-                  </a:txBody>
-                  <a:tcPr anchor="ctr"/>
-                </a:tc>
-                <a:tc>
-                  <a:txBody>
-                    <a:bodyPr/>
-                    <a:lstStyle/>
-                    <a:p>
-                      <a:r>
-                        <a:rPr lang="en-US" sz="2000" b="0" dirty="0"/>
-                        <a:t>90</a:t>
-                      </a:r>
-                    </a:p>
-                  </a:txBody>
-                  <a:tcPr anchor="ctr"/>
-                </a:tc>
-                <a:tc>
-                  <a:txBody>
-                    <a:bodyPr/>
-                    <a:lstStyle/>
-                    <a:p>
-                      <a:r>
-                        <a:rPr lang="en-US" sz="2000" b="0" dirty="0"/>
-                        <a:t>95</a:t>
-                      </a:r>
-                    </a:p>
-                  </a:txBody>
-                  <a:tcPr anchor="ctr"/>
-                </a:tc>
-                <a:extLst>
-                  <a:ext uri="{0D108BD9-81ED-4DB2-BD59-A6C34878D82A}">
-                    <a16:rowId xmlns="" xmlns:a16="http://schemas.microsoft.com/office/drawing/2014/main" val="3150194648"/>
-                  </a:ext>
-                </a:extLst>
-              </a:tr>
-              <a:tr h="812163">
-                <a:tc>
-                  <a:txBody>
-                    <a:bodyPr/>
-                    <a:lstStyle/>
-                    <a:p>
-                      <a:r>
-                        <a:rPr lang="en-US" sz="2000" b="0" dirty="0"/>
-                        <a:t>Rate of information retention</a:t>
-                      </a:r>
-                    </a:p>
-                  </a:txBody>
-                  <a:tcPr anchor="ctr"/>
-                </a:tc>
-                <a:tc>
-                  <a:txBody>
-                    <a:bodyPr/>
-                    <a:lstStyle/>
-                    <a:p>
-                      <a:r>
-                        <a:rPr lang="en-US" sz="2000" b="0" dirty="0"/>
-                        <a:t>Percentage (%)</a:t>
-                      </a:r>
-                    </a:p>
-                  </a:txBody>
-                  <a:tcPr anchor="ctr"/>
-                </a:tc>
-                <a:tc>
-                  <a:txBody>
-                    <a:bodyPr/>
-                    <a:lstStyle/>
-                    <a:p>
-                      <a:r>
-                        <a:rPr lang="en-US" sz="2000" b="0" dirty="0"/>
-                        <a:t>80</a:t>
-                      </a:r>
-                    </a:p>
-                  </a:txBody>
-                  <a:tcPr anchor="ctr"/>
-                </a:tc>
-                <a:tc>
-                  <a:txBody>
-                    <a:bodyPr/>
-                    <a:lstStyle/>
-                    <a:p>
-                      <a:r>
-                        <a:rPr lang="en-US" sz="2000" b="0" dirty="0"/>
-                        <a:t>85</a:t>
-                      </a:r>
-                    </a:p>
-                  </a:txBody>
-                  <a:tcPr anchor="ctr"/>
-                </a:tc>
-                <a:extLst>
-                  <a:ext uri="{0D108BD9-81ED-4DB2-BD59-A6C34878D82A}">
-                    <a16:rowId xmlns="" xmlns:a16="http://schemas.microsoft.com/office/drawing/2014/main" val="380950325"/>
-                  </a:ext>
-                </a:extLst>
-              </a:tr>
-            </a:tbl>
-          </a:graphicData>
-        </a:graphic>
-      </p:graphicFrame>
-      <p:sp>
-        <p:nvSpPr>
-          <p:cNvPr id="5" name="Slide Number Placeholder 4">
-            <a:extLst>
-              <a:ext uri="{FF2B5EF4-FFF2-40B4-BE49-F238E27FC236}">
-                <a16:creationId xmlns="" xmlns:a16="http://schemas.microsoft.com/office/drawing/2014/main" id="{7F576313-F1C8-57CB-82F6-54BC07D3B9F4}"/>
-              </a:ext>
-            </a:extLst>
-          </p:cNvPr>
-          <p:cNvSpPr>
-            <a:spLocks noGrp="1"/>
-          </p:cNvSpPr>
-          <p:nvPr>
-            <p:ph type="sldNum" sz="quarter" idx="4"/>
-          </p:nvPr>
-        </p:nvSpPr>
-        <p:spPr>
-          <a:xfrm>
-            <a:off x="11353800" y="5879804"/>
-            <a:ext cx="661416" cy="895899"/>
-          </a:xfrm>
-        </p:spPr>
-        <p:txBody>
-          <a:bodyPr/>
-          <a:lstStyle/>
           <a:p>
-            <a:fld id="{58FB4751-880F-D840-AAA9-3A15815CC996}" type="slidenum">
-              <a:rPr lang="en-US" smtClean="0"/>
-              <a:pPr/>
-              <a:t>6</a:t>
-            </a:fld>
-            <a:endParaRPr lang="en-US" dirty="0"/>
+            <a:pPr lvl="1">
+              <a:buFont typeface="Arial" pitchFamily="34" charset="0"/>
+              <a:buChar char="•"/>
+            </a:pPr>
+            <a:r>
+              <a:rPr lang="ru-RU" sz="2200" dirty="0" smtClean="0"/>
+              <a:t> </a:t>
+            </a:r>
+            <a:r>
+              <a:rPr lang="ru-RU" sz="2200" dirty="0" smtClean="0"/>
+              <a:t>Расширение информации о погоде и ее конкретная настройка под каждого пользователя.</a:t>
+            </a:r>
+          </a:p>
+          <a:p>
+            <a:pPr lvl="1"/>
+            <a:endParaRPr lang="ru-RU" dirty="0" smtClean="0"/>
+          </a:p>
+          <a:p>
+            <a:pPr lvl="1">
+              <a:buFont typeface="Arial" pitchFamily="34" charset="0"/>
+              <a:buChar char="•"/>
+            </a:pPr>
+            <a:endParaRPr lang="ru-RU" dirty="0" smtClean="0"/>
           </a:p>
         </p:txBody>
       </p:sp>
     </p:spTree>
     <p:extLst>
       <p:ext uri="{BB962C8B-B14F-4D97-AF65-F5344CB8AC3E}">
-        <p14:creationId xmlns="" xmlns:p14="http://schemas.microsoft.com/office/powerpoint/2010/main" val="537809529"/>
+        <p14:creationId xmlns:p14="http://schemas.microsoft.com/office/powerpoint/2010/main" xmlns="" val="1096717490"/>
       </p:ext>
     </p:extLst>
   </p:cSld>
   <p:clrMapOvr>
     <a:masterClrMapping/>
   </p:clrMapOvr>
+  <p:timing>
+    <p:tnLst>
+      <p:par>
+        <p:cTn id="1" dur="indefinite" restart="never" nodeType="tmRoot"/>
+      </p:par>
+    </p:tnLst>
+  </p:timing>
 </p:sld>
 </file>
 
-<file path=ppt/slides/slide7.xml><?xml version="1.0" encoding="utf-8"?>
+<file path=ppt/slides/slide6.xml><?xml version="1.0" encoding="utf-8"?>
 <p:sld xmlns:a="http://schemas.openxmlformats.org/drawingml/2006/main" xmlns:r="http://schemas.openxmlformats.org/officeDocument/2006/relationships" xmlns:p="http://schemas.openxmlformats.org/presentationml/2006/main">
   <p:cSld>
     <p:bg>
@@ -28231,7 +27795,7 @@
           <p:cNvPr id="6" name="Title 5">
             <a:extLst>
               <a:ext uri="{FF2B5EF4-FFF2-40B4-BE49-F238E27FC236}">
-                <a16:creationId xmlns="" xmlns:a16="http://schemas.microsoft.com/office/drawing/2014/main" id="{D5DC0028-4150-0F89-E59C-F563C67F6CFD}"/>
+                <a16:creationId xmlns:a16="http://schemas.microsoft.com/office/drawing/2014/main" xmlns="" id="{D5DC0028-4150-0F89-E59C-F563C67F6CFD}"/>
               </a:ext>
             </a:extLst>
           </p:cNvPr>
@@ -28265,7 +27829,7 @@
           <p:cNvPr id="11" name="Content Placeholder 10">
             <a:extLst>
               <a:ext uri="{FF2B5EF4-FFF2-40B4-BE49-F238E27FC236}">
-                <a16:creationId xmlns="" xmlns:a16="http://schemas.microsoft.com/office/drawing/2014/main" id="{C6DCC38C-603B-CCD0-2914-0BBCD4F4F74E}"/>
+                <a16:creationId xmlns:a16="http://schemas.microsoft.com/office/drawing/2014/main" xmlns="" id="{C6DCC38C-603B-CCD0-2914-0BBCD4F4F74E}"/>
               </a:ext>
             </a:extLst>
           </p:cNvPr>
@@ -28307,13 +27871,20 @@
     </p:spTree>
     <p:extLst>
       <p:ext uri="{BB962C8B-B14F-4D97-AF65-F5344CB8AC3E}">
-        <p14:creationId xmlns="" xmlns:p14="http://schemas.microsoft.com/office/powerpoint/2010/main" val="2188828507"/>
+        <p14:creationId xmlns:p14="http://schemas.microsoft.com/office/powerpoint/2010/main" xmlns="" val="2188828507"/>
       </p:ext>
     </p:extLst>
   </p:cSld>
   <p:clrMapOvr>
     <a:masterClrMapping/>
   </p:clrMapOvr>
+  <p:timing>
+    <p:tnLst>
+      <p:par>
+        <p:cTn id="1" dur="indefinite" restart="never" nodeType="tmRoot"/>
+      </p:par>
+    </p:tnLst>
+  </p:timing>
 </p:sld>
 </file>
 
@@ -28512,7 +28083,7 @@
   <a:extraClrSchemeLst/>
   <a:extLst>
     <a:ext uri="{05A4C25C-085E-4340-85A3-A5531E510DB2}">
-      <thm15:themeFamily xmlns="" xmlns:thm15="http://schemas.microsoft.com/office/thememl/2012/main" name="TM11964407_win32_SD_v20" id="{3EA9D323-E7D5-42E3-83AA-4E89B21FB6B6}" vid="{BDF16A16-3A0E-4332-958C-C5797045A0D6}"/>
+      <thm15:themeFamily xmlns:thm15="http://schemas.microsoft.com/office/thememl/2012/main" xmlns="" name="TM11964407_win32_SD_v20" id="{3EA9D323-E7D5-42E3-83AA-4E89B21FB6B6}" vid="{BDF16A16-3A0E-4332-958C-C5797045A0D6}"/>
     </a:ext>
   </a:extLst>
 </a:theme>
@@ -28807,7 +28378,7 @@
   <a:extraClrSchemeLst/>
   <a:extLst>
     <a:ext uri="{05A4C25C-085E-4340-85A3-A5531E510DB2}">
-      <thm15:themeFamily xmlns="" xmlns:thm15="http://schemas.microsoft.com/office/thememl/2012/main" name="Office Theme" id="{62F939B6-93AF-4DB8-9C6B-D6C7DFDC589F}" vid="{4A3C46E8-61CC-4603-A589-7422A47A8E4A}"/>
+      <thm15:themeFamily xmlns:thm15="http://schemas.microsoft.com/office/thememl/2012/main" xmlns="" name="Office Theme" id="{62F939B6-93AF-4DB8-9C6B-D6C7DFDC589F}" vid="{4A3C46E8-61CC-4603-A589-7422A47A8E4A}"/>
     </a:ext>
   </a:extLst>
 </a:theme>
@@ -29102,42 +28673,13 @@
   <a:extraClrSchemeLst/>
   <a:extLst>
     <a:ext uri="{05A4C25C-085E-4340-85A3-A5531E510DB2}">
-      <thm15:themeFamily xmlns="" xmlns:thm15="http://schemas.microsoft.com/office/thememl/2012/main" name="Office Theme" id="{62F939B6-93AF-4DB8-9C6B-D6C7DFDC589F}" vid="{4A3C46E8-61CC-4603-A589-7422A47A8E4A}"/>
+      <thm15:themeFamily xmlns:thm15="http://schemas.microsoft.com/office/thememl/2012/main" xmlns="" name="Office Theme" id="{62F939B6-93AF-4DB8-9C6B-D6C7DFDC589F}" vid="{4A3C46E8-61CC-4603-A589-7422A47A8E4A}"/>
     </a:ext>
   </a:extLst>
 </a:theme>
 </file>
 
 <file path=customXml/item1.xml><?xml version="1.0" encoding="utf-8"?>
-<p:properties xmlns:p="http://schemas.microsoft.com/office/2006/metadata/properties" xmlns:xsi="http://www.w3.org/2001/XMLSchema-instance" xmlns:pc="http://schemas.microsoft.com/office/infopath/2007/PartnerControls">
-  <documentManagement>
-    <_ip_UnifiedCompliancePolicyUIAction xmlns="http://schemas.microsoft.com/sharepoint/v3" xsi:nil="true"/>
-    <Image xmlns="71af3243-3dd4-4a8d-8c0d-dd76da1f02a5">
-      <Url xsi:nil="true"/>
-      <Description xsi:nil="true"/>
-    </Image>
-    <Status xmlns="71af3243-3dd4-4a8d-8c0d-dd76da1f02a5">Not started</Status>
-    <Background xmlns="71af3243-3dd4-4a8d-8c0d-dd76da1f02a5">false</Background>
-    <_ip_UnifiedCompliancePolicyProperties xmlns="http://schemas.microsoft.com/sharepoint/v3" xsi:nil="true"/>
-    <ImageTagsTaxHTField xmlns="71af3243-3dd4-4a8d-8c0d-dd76da1f02a5">
-      <Terms xmlns="http://schemas.microsoft.com/office/infopath/2007/PartnerControls"/>
-    </ImageTagsTaxHTField>
-    <TaxCatchAll xmlns="230e9df3-be65-4c73-a93b-d1236ebd677e" xsi:nil="true"/>
-    <MediaServiceKeyPoints xmlns="71af3243-3dd4-4a8d-8c0d-dd76da1f02a5" xsi:nil="true"/>
-  </documentManagement>
-</p:properties>
-</file>
-
-<file path=customXml/item2.xml><?xml version="1.0" encoding="utf-8"?>
-<?mso-contentType ?>
-<FormTemplates xmlns="http://schemas.microsoft.com/sharepoint/v3/contenttype/forms">
-  <Display>DocumentLibraryForm</Display>
-  <Edit>DocumentLibraryForm</Edit>
-  <New>DocumentLibraryForm</New>
-</FormTemplates>
-</file>
-
-<file path=customXml/item3.xml><?xml version="1.0" encoding="utf-8"?>
 <ct:contentTypeSchema xmlns:ct="http://schemas.microsoft.com/office/2006/metadata/contentType" xmlns:ma="http://schemas.microsoft.com/office/2006/metadata/properties/metaAttributes" ct:_="" ma:_="" ma:contentTypeName="Document" ma:contentTypeID="0x01010079F111ED35F8CC479449609E8A0923A6" ma:contentTypeVersion="28" ma:contentTypeDescription="Create a new document." ma:contentTypeScope="" ma:versionID="60f5a4f2d2b0abadcf532d48ebf9cb71">
   <xsd:schema xmlns:xsd="http://www.w3.org/2001/XMLSchema" xmlns:xs="http://www.w3.org/2001/XMLSchema" xmlns:p="http://schemas.microsoft.com/office/2006/metadata/properties" xmlns:ns1="http://schemas.microsoft.com/sharepoint/v3" xmlns:ns2="71af3243-3dd4-4a8d-8c0d-dd76da1f02a5" xmlns:ns3="16c05727-aa75-4e4a-9b5f-8a80a1165891" xmlns:ns4="230e9df3-be65-4c73-a93b-d1236ebd677e" targetNamespace="http://schemas.microsoft.com/office/2006/metadata/properties" ma:root="true" ma:fieldsID="7dd78129e6a1811f84807ad11c651531" ns1:_="" ns2:_="" ns3:_="" ns4:_="">
     <xsd:import namespace="http://schemas.microsoft.com/sharepoint/v3"/>
@@ -29449,27 +28991,36 @@
 </ct:contentTypeSchema>
 </file>
 
-<file path=customXml/itemProps1.xml><?xml version="1.0" encoding="utf-8"?>
-<ds:datastoreItem xmlns:ds="http://schemas.openxmlformats.org/officeDocument/2006/customXml" ds:itemID="{85DF9CEC-52C2-4D14-B2F5-11176002A8B6}">
-  <ds:schemaRefs>
-    <ds:schemaRef ds:uri="http://schemas.microsoft.com/office/2006/metadata/properties"/>
-    <ds:schemaRef ds:uri="http://schemas.microsoft.com/office/infopath/2007/PartnerControls"/>
-    <ds:schemaRef ds:uri="http://schemas.microsoft.com/sharepoint/v3"/>
-    <ds:schemaRef ds:uri="71af3243-3dd4-4a8d-8c0d-dd76da1f02a5"/>
-    <ds:schemaRef ds:uri="230e9df3-be65-4c73-a93b-d1236ebd677e"/>
-  </ds:schemaRefs>
-</ds:datastoreItem>
+<file path=customXml/item2.xml><?xml version="1.0" encoding="utf-8"?>
+<?mso-contentType ?>
+<FormTemplates xmlns="http://schemas.microsoft.com/sharepoint/v3/contenttype/forms">
+  <Display>DocumentLibraryForm</Display>
+  <Edit>DocumentLibraryForm</Edit>
+  <New>DocumentLibraryForm</New>
+</FormTemplates>
 </file>
 
-<file path=customXml/itemProps2.xml><?xml version="1.0" encoding="utf-8"?>
-<ds:datastoreItem xmlns:ds="http://schemas.openxmlformats.org/officeDocument/2006/customXml" ds:itemID="{1249AD37-9510-4A2D-B790-12C439A83F93}">
-  <ds:schemaRefs>
-    <ds:schemaRef ds:uri="http://schemas.microsoft.com/sharepoint/v3/contenttype/forms"/>
-  </ds:schemaRefs>
-</ds:datastoreItem>
+<file path=customXml/item3.xml><?xml version="1.0" encoding="utf-8"?>
+<p:properties xmlns:p="http://schemas.microsoft.com/office/2006/metadata/properties" xmlns:xsi="http://www.w3.org/2001/XMLSchema-instance" xmlns:pc="http://schemas.microsoft.com/office/infopath/2007/PartnerControls">
+  <documentManagement>
+    <_ip_UnifiedCompliancePolicyUIAction xmlns="http://schemas.microsoft.com/sharepoint/v3" xsi:nil="true"/>
+    <Image xmlns="71af3243-3dd4-4a8d-8c0d-dd76da1f02a5">
+      <Url xsi:nil="true"/>
+      <Description xsi:nil="true"/>
+    </Image>
+    <Status xmlns="71af3243-3dd4-4a8d-8c0d-dd76da1f02a5">Not started</Status>
+    <Background xmlns="71af3243-3dd4-4a8d-8c0d-dd76da1f02a5">false</Background>
+    <_ip_UnifiedCompliancePolicyProperties xmlns="http://schemas.microsoft.com/sharepoint/v3" xsi:nil="true"/>
+    <ImageTagsTaxHTField xmlns="71af3243-3dd4-4a8d-8c0d-dd76da1f02a5">
+      <Terms xmlns="http://schemas.microsoft.com/office/infopath/2007/PartnerControls"/>
+    </ImageTagsTaxHTField>
+    <TaxCatchAll xmlns="230e9df3-be65-4c73-a93b-d1236ebd677e" xsi:nil="true"/>
+    <MediaServiceKeyPoints xmlns="71af3243-3dd4-4a8d-8c0d-dd76da1f02a5" xsi:nil="true"/>
+  </documentManagement>
+</p:properties>
 </file>
 
-<file path=customXml/itemProps3.xml><?xml version="1.0" encoding="utf-8"?>
+<file path=customXml/itemProps1.xml><?xml version="1.0" encoding="utf-8"?>
 <ds:datastoreItem xmlns:ds="http://schemas.openxmlformats.org/officeDocument/2006/customXml" ds:itemID="{4D8B1D1D-0064-435C-8533-29A36067B8ED}">
   <ds:schemaRefs>
     <ds:schemaRef ds:uri="http://schemas.microsoft.com/office/2006/metadata/contentType"/>
@@ -29490,6 +29041,26 @@
 </ds:datastoreItem>
 </file>
 
+<file path=customXml/itemProps2.xml><?xml version="1.0" encoding="utf-8"?>
+<ds:datastoreItem xmlns:ds="http://schemas.openxmlformats.org/officeDocument/2006/customXml" ds:itemID="{1249AD37-9510-4A2D-B790-12C439A83F93}">
+  <ds:schemaRefs>
+    <ds:schemaRef ds:uri="http://schemas.microsoft.com/sharepoint/v3/contenttype/forms"/>
+  </ds:schemaRefs>
+</ds:datastoreItem>
+</file>
+
+<file path=customXml/itemProps3.xml><?xml version="1.0" encoding="utf-8"?>
+<ds:datastoreItem xmlns:ds="http://schemas.openxmlformats.org/officeDocument/2006/customXml" ds:itemID="{85DF9CEC-52C2-4D14-B2F5-11176002A8B6}">
+  <ds:schemaRefs>
+    <ds:schemaRef ds:uri="http://schemas.microsoft.com/office/2006/metadata/properties"/>
+    <ds:schemaRef ds:uri="http://schemas.microsoft.com/office/infopath/2007/PartnerControls"/>
+    <ds:schemaRef ds:uri="http://schemas.microsoft.com/sharepoint/v3"/>
+    <ds:schemaRef ds:uri="71af3243-3dd4-4a8d-8c0d-dd76da1f02a5"/>
+    <ds:schemaRef ds:uri="230e9df3-be65-4c73-a93b-d1236ebd677e"/>
+  </ds:schemaRefs>
+</ds:datastoreItem>
+</file>
+
 <file path=docMetadata/LabelInfo.xml><?xml version="1.0" encoding="utf-8"?>
 <clbl:labelList xmlns:clbl="http://schemas.microsoft.com/office/2020/mipLabelMetadata"/>
 </file>
</xml_diff>